<commit_message>
Updating tests and docs
</commit_message>
<xml_diff>
--- a/inst/extras/cheatsheet.pptx
+++ b/inst/extras/cheatsheet.pptx
@@ -5,10 +5,11 @@
     <p:sldMasterId id="2147483648" r:id="rId1"/>
   </p:sldMasterIdLst>
   <p:notesMasterIdLst>
-    <p:notesMasterId r:id="rId3"/>
+    <p:notesMasterId r:id="rId4"/>
   </p:notesMasterIdLst>
   <p:sldIdLst>
     <p:sldId id="258" r:id="rId2"/>
+    <p:sldId id="259" r:id="rId3"/>
   </p:sldIdLst>
   <p:sldSz cx="12192000" cy="6858000"/>
   <p:notesSz cx="6858000" cy="9144000"/>
@@ -197,7 +198,7 @@
           <a:p>
             <a:fld id="{D0A1FD91-65A3-4356-9704-301FA4DE96A7}" type="datetimeFigureOut">
               <a:rPr lang="en-US" smtClean="0"/>
-              <a:t>7/9/2021</a:t>
+              <a:t>7/13/2021</a:t>
             </a:fld>
             <a:endParaRPr lang="en-US"/>
           </a:p>
@@ -548,6 +549,90 @@
 </p:notes>
 </file>
 
+<file path=ppt/notesSlides/notesSlide2.xml><?xml version="1.0" encoding="utf-8"?>
+<p:notes xmlns:a="http://schemas.openxmlformats.org/drawingml/2006/main" xmlns:r="http://schemas.openxmlformats.org/officeDocument/2006/relationships" xmlns:p="http://schemas.openxmlformats.org/presentationml/2006/main">
+  <p:cSld>
+    <p:spTree>
+      <p:nvGrpSpPr>
+        <p:cNvPr id="1" name=""/>
+        <p:cNvGrpSpPr/>
+        <p:nvPr/>
+      </p:nvGrpSpPr>
+      <p:grpSpPr>
+        <a:xfrm>
+          <a:off x="0" y="0"/>
+          <a:ext cx="0" cy="0"/>
+          <a:chOff x="0" y="0"/>
+          <a:chExt cx="0" cy="0"/>
+        </a:xfrm>
+      </p:grpSpPr>
+      <p:sp>
+        <p:nvSpPr>
+          <p:cNvPr id="2" name="Slide Image Placeholder 1"/>
+          <p:cNvSpPr>
+            <a:spLocks noGrp="1" noRot="1" noChangeAspect="1"/>
+          </p:cNvSpPr>
+          <p:nvPr>
+            <p:ph type="sldImg"/>
+          </p:nvPr>
+        </p:nvSpPr>
+        <p:spPr/>
+      </p:sp>
+      <p:sp>
+        <p:nvSpPr>
+          <p:cNvPr id="3" name="Notes Placeholder 2"/>
+          <p:cNvSpPr>
+            <a:spLocks noGrp="1"/>
+          </p:cNvSpPr>
+          <p:nvPr>
+            <p:ph type="body" idx="1"/>
+          </p:nvPr>
+        </p:nvSpPr>
+        <p:spPr/>
+        <p:txBody>
+          <a:bodyPr/>
+          <a:lstStyle/>
+          <a:p>
+            <a:endParaRPr lang="en-US"/>
+          </a:p>
+        </p:txBody>
+      </p:sp>
+      <p:sp>
+        <p:nvSpPr>
+          <p:cNvPr id="4" name="Slide Number Placeholder 3"/>
+          <p:cNvSpPr>
+            <a:spLocks noGrp="1"/>
+          </p:cNvSpPr>
+          <p:nvPr>
+            <p:ph type="sldNum" sz="quarter" idx="5"/>
+          </p:nvPr>
+        </p:nvSpPr>
+        <p:spPr/>
+        <p:txBody>
+          <a:bodyPr/>
+          <a:lstStyle/>
+          <a:p>
+            <a:fld id="{43C70CDB-399F-4BF9-A069-67DDD871CA16}" type="slidenum">
+              <a:rPr lang="en-US" smtClean="0"/>
+              <a:t>2</a:t>
+            </a:fld>
+            <a:endParaRPr lang="en-US"/>
+          </a:p>
+        </p:txBody>
+      </p:sp>
+    </p:spTree>
+    <p:extLst>
+      <p:ext uri="{BB962C8B-B14F-4D97-AF65-F5344CB8AC3E}">
+        <p14:creationId xmlns:p14="http://schemas.microsoft.com/office/powerpoint/2010/main" val="3607993087"/>
+      </p:ext>
+    </p:extLst>
+  </p:cSld>
+  <p:clrMapOvr>
+    <a:masterClrMapping/>
+  </p:clrMapOvr>
+</p:notes>
+</file>
+
 <file path=ppt/slideLayouts/slideLayout1.xml><?xml version="1.0" encoding="utf-8"?>
 <p:sldLayout xmlns:a="http://schemas.openxmlformats.org/drawingml/2006/main" xmlns:r="http://schemas.openxmlformats.org/officeDocument/2006/relationships" xmlns:p="http://schemas.openxmlformats.org/presentationml/2006/main" type="title" preserve="1">
   <p:cSld name="Title Slide">
@@ -695,7 +780,7 @@
           <a:p>
             <a:fld id="{89D4607A-7F2D-4A84-AFA7-3FE67E9D53B7}" type="datetimeFigureOut">
               <a:rPr lang="en-US" smtClean="0"/>
-              <a:t>7/9/2021</a:t>
+              <a:t>7/13/2021</a:t>
             </a:fld>
             <a:endParaRPr lang="en-US"/>
           </a:p>
@@ -893,7 +978,7 @@
           <a:p>
             <a:fld id="{89D4607A-7F2D-4A84-AFA7-3FE67E9D53B7}" type="datetimeFigureOut">
               <a:rPr lang="en-US" smtClean="0"/>
-              <a:t>7/9/2021</a:t>
+              <a:t>7/13/2021</a:t>
             </a:fld>
             <a:endParaRPr lang="en-US"/>
           </a:p>
@@ -1101,7 +1186,7 @@
           <a:p>
             <a:fld id="{89D4607A-7F2D-4A84-AFA7-3FE67E9D53B7}" type="datetimeFigureOut">
               <a:rPr lang="en-US" smtClean="0"/>
-              <a:t>7/9/2021</a:t>
+              <a:t>7/13/2021</a:t>
             </a:fld>
             <a:endParaRPr lang="en-US"/>
           </a:p>
@@ -1299,7 +1384,7 @@
           <a:p>
             <a:fld id="{89D4607A-7F2D-4A84-AFA7-3FE67E9D53B7}" type="datetimeFigureOut">
               <a:rPr lang="en-US" smtClean="0"/>
-              <a:t>7/9/2021</a:t>
+              <a:t>7/13/2021</a:t>
             </a:fld>
             <a:endParaRPr lang="en-US"/>
           </a:p>
@@ -1574,7 +1659,7 @@
           <a:p>
             <a:fld id="{89D4607A-7F2D-4A84-AFA7-3FE67E9D53B7}" type="datetimeFigureOut">
               <a:rPr lang="en-US" smtClean="0"/>
-              <a:t>7/9/2021</a:t>
+              <a:t>7/13/2021</a:t>
             </a:fld>
             <a:endParaRPr lang="en-US"/>
           </a:p>
@@ -1839,7 +1924,7 @@
           <a:p>
             <a:fld id="{89D4607A-7F2D-4A84-AFA7-3FE67E9D53B7}" type="datetimeFigureOut">
               <a:rPr lang="en-US" smtClean="0"/>
-              <a:t>7/9/2021</a:t>
+              <a:t>7/13/2021</a:t>
             </a:fld>
             <a:endParaRPr lang="en-US"/>
           </a:p>
@@ -2251,7 +2336,7 @@
           <a:p>
             <a:fld id="{89D4607A-7F2D-4A84-AFA7-3FE67E9D53B7}" type="datetimeFigureOut">
               <a:rPr lang="en-US" smtClean="0"/>
-              <a:t>7/9/2021</a:t>
+              <a:t>7/13/2021</a:t>
             </a:fld>
             <a:endParaRPr lang="en-US"/>
           </a:p>
@@ -2392,7 +2477,7 @@
           <a:p>
             <a:fld id="{89D4607A-7F2D-4A84-AFA7-3FE67E9D53B7}" type="datetimeFigureOut">
               <a:rPr lang="en-US" smtClean="0"/>
-              <a:t>7/9/2021</a:t>
+              <a:t>7/13/2021</a:t>
             </a:fld>
             <a:endParaRPr lang="en-US"/>
           </a:p>
@@ -2505,7 +2590,7 @@
           <a:p>
             <a:fld id="{89D4607A-7F2D-4A84-AFA7-3FE67E9D53B7}" type="datetimeFigureOut">
               <a:rPr lang="en-US" smtClean="0"/>
-              <a:t>7/9/2021</a:t>
+              <a:t>7/13/2021</a:t>
             </a:fld>
             <a:endParaRPr lang="en-US"/>
           </a:p>
@@ -2816,7 +2901,7 @@
           <a:p>
             <a:fld id="{89D4607A-7F2D-4A84-AFA7-3FE67E9D53B7}" type="datetimeFigureOut">
               <a:rPr lang="en-US" smtClean="0"/>
-              <a:t>7/9/2021</a:t>
+              <a:t>7/13/2021</a:t>
             </a:fld>
             <a:endParaRPr lang="en-US"/>
           </a:p>
@@ -3104,7 +3189,7 @@
           <a:p>
             <a:fld id="{89D4607A-7F2D-4A84-AFA7-3FE67E9D53B7}" type="datetimeFigureOut">
               <a:rPr lang="en-US" smtClean="0"/>
-              <a:t>7/9/2021</a:t>
+              <a:t>7/13/2021</a:t>
             </a:fld>
             <a:endParaRPr lang="en-US"/>
           </a:p>
@@ -3345,7 +3430,7 @@
           <a:p>
             <a:fld id="{89D4607A-7F2D-4A84-AFA7-3FE67E9D53B7}" type="datetimeFigureOut">
               <a:rPr lang="en-US" smtClean="0"/>
-              <a:t>7/9/2021</a:t>
+              <a:t>7/13/2021</a:t>
             </a:fld>
             <a:endParaRPr lang="en-US"/>
           </a:p>
@@ -7442,6 +7527,440 @@
     <p:extLst>
       <p:ext uri="{BB962C8B-B14F-4D97-AF65-F5344CB8AC3E}">
         <p14:creationId xmlns:p14="http://schemas.microsoft.com/office/powerpoint/2010/main" val="2059046414"/>
+      </p:ext>
+    </p:extLst>
+  </p:cSld>
+  <p:clrMapOvr>
+    <a:masterClrMapping/>
+  </p:clrMapOvr>
+</p:sld>
+</file>
+
+<file path=ppt/slides/slide2.xml><?xml version="1.0" encoding="utf-8"?>
+<p:sld xmlns:a="http://schemas.openxmlformats.org/drawingml/2006/main" xmlns:r="http://schemas.openxmlformats.org/officeDocument/2006/relationships" xmlns:p="http://schemas.openxmlformats.org/presentationml/2006/main">
+  <p:cSld>
+    <p:spTree>
+      <p:nvGrpSpPr>
+        <p:cNvPr id="1" name=""/>
+        <p:cNvGrpSpPr/>
+        <p:nvPr/>
+      </p:nvGrpSpPr>
+      <p:grpSpPr>
+        <a:xfrm>
+          <a:off x="0" y="0"/>
+          <a:ext cx="0" cy="0"/>
+          <a:chOff x="0" y="0"/>
+          <a:chExt cx="0" cy="0"/>
+        </a:xfrm>
+      </p:grpSpPr>
+      <p:sp>
+        <p:nvSpPr>
+          <p:cNvPr id="75" name="Rectangle: Rounded Corners 74">
+            <a:extLst>
+              <a:ext uri="{FF2B5EF4-FFF2-40B4-BE49-F238E27FC236}">
+                <a16:creationId xmlns:a16="http://schemas.microsoft.com/office/drawing/2014/main" id="{D39E3418-1558-4C4B-A4F7-774C7CBE38E4}"/>
+              </a:ext>
+            </a:extLst>
+          </p:cNvPr>
+          <p:cNvSpPr/>
+          <p:nvPr/>
+        </p:nvSpPr>
+        <p:spPr>
+          <a:xfrm>
+            <a:off x="3302167" y="66676"/>
+            <a:ext cx="8748574" cy="6695199"/>
+          </a:xfrm>
+          <a:prstGeom prst="roundRect">
+            <a:avLst>
+              <a:gd name="adj" fmla="val 4514"/>
+            </a:avLst>
+          </a:prstGeom>
+          <a:solidFill>
+            <a:schemeClr val="accent4">
+              <a:lumMod val="20000"/>
+              <a:lumOff val="80000"/>
+            </a:schemeClr>
+          </a:solidFill>
+          <a:ln>
+            <a:solidFill>
+              <a:schemeClr val="bg1">
+                <a:lumMod val="65000"/>
+              </a:schemeClr>
+            </a:solidFill>
+          </a:ln>
+        </p:spPr>
+        <p:style>
+          <a:lnRef idx="2">
+            <a:schemeClr val="accent1">
+              <a:shade val="50000"/>
+            </a:schemeClr>
+          </a:lnRef>
+          <a:fillRef idx="1">
+            <a:schemeClr val="accent1"/>
+          </a:fillRef>
+          <a:effectRef idx="0">
+            <a:schemeClr val="accent1"/>
+          </a:effectRef>
+          <a:fontRef idx="minor">
+            <a:schemeClr val="lt1"/>
+          </a:fontRef>
+        </p:style>
+        <p:txBody>
+          <a:bodyPr rtlCol="0" anchor="ctr"/>
+          <a:lstStyle/>
+          <a:p>
+            <a:pPr algn="ctr"/>
+            <a:endParaRPr lang="en-US"/>
+          </a:p>
+        </p:txBody>
+      </p:sp>
+      <p:sp>
+        <p:nvSpPr>
+          <p:cNvPr id="76" name="Rectangle: Rounded Corners 75">
+            <a:extLst>
+              <a:ext uri="{FF2B5EF4-FFF2-40B4-BE49-F238E27FC236}">
+                <a16:creationId xmlns:a16="http://schemas.microsoft.com/office/drawing/2014/main" id="{171E17C3-B4FC-4C61-96E6-6F131783C199}"/>
+              </a:ext>
+            </a:extLst>
+          </p:cNvPr>
+          <p:cNvSpPr/>
+          <p:nvPr/>
+        </p:nvSpPr>
+        <p:spPr>
+          <a:xfrm>
+            <a:off x="3297416" y="71791"/>
+            <a:ext cx="8748573" cy="274320"/>
+          </a:xfrm>
+          <a:prstGeom prst="roundRect">
+            <a:avLst/>
+          </a:prstGeom>
+          <a:solidFill>
+            <a:schemeClr val="tx1"/>
+          </a:solidFill>
+          <a:ln>
+            <a:solidFill>
+              <a:schemeClr val="tx1">
+                <a:lumMod val="65000"/>
+                <a:lumOff val="35000"/>
+              </a:schemeClr>
+            </a:solidFill>
+          </a:ln>
+        </p:spPr>
+        <p:style>
+          <a:lnRef idx="2">
+            <a:schemeClr val="accent1">
+              <a:shade val="50000"/>
+            </a:schemeClr>
+          </a:lnRef>
+          <a:fillRef idx="1">
+            <a:schemeClr val="accent1"/>
+          </a:fillRef>
+          <a:effectRef idx="0">
+            <a:schemeClr val="accent1"/>
+          </a:effectRef>
+          <a:fontRef idx="minor">
+            <a:schemeClr val="lt1"/>
+          </a:fontRef>
+        </p:style>
+        <p:txBody>
+          <a:bodyPr rtlCol="0" anchor="ctr"/>
+          <a:lstStyle/>
+          <a:p>
+            <a:pPr algn="ctr"/>
+            <a:r>
+              <a:rPr lang="en-US" b="1" dirty="0"/>
+              <a:t>Details</a:t>
+            </a:r>
+          </a:p>
+        </p:txBody>
+      </p:sp>
+      <p:sp>
+        <p:nvSpPr>
+          <p:cNvPr id="26" name="Rectangle: Rounded Corners 25">
+            <a:extLst>
+              <a:ext uri="{FF2B5EF4-FFF2-40B4-BE49-F238E27FC236}">
+                <a16:creationId xmlns:a16="http://schemas.microsoft.com/office/drawing/2014/main" id="{597A2B9E-B283-447B-93EE-29035DA7D63F}"/>
+              </a:ext>
+            </a:extLst>
+          </p:cNvPr>
+          <p:cNvSpPr/>
+          <p:nvPr/>
+        </p:nvSpPr>
+        <p:spPr>
+          <a:xfrm>
+            <a:off x="142289" y="986986"/>
+            <a:ext cx="3017520" cy="5774889"/>
+          </a:xfrm>
+          <a:prstGeom prst="roundRect">
+            <a:avLst>
+              <a:gd name="adj" fmla="val 4514"/>
+            </a:avLst>
+          </a:prstGeom>
+          <a:solidFill>
+            <a:schemeClr val="accent4">
+              <a:lumMod val="20000"/>
+              <a:lumOff val="80000"/>
+            </a:schemeClr>
+          </a:solidFill>
+          <a:ln>
+            <a:solidFill>
+              <a:schemeClr val="bg1">
+                <a:lumMod val="65000"/>
+              </a:schemeClr>
+            </a:solidFill>
+          </a:ln>
+        </p:spPr>
+        <p:style>
+          <a:lnRef idx="2">
+            <a:schemeClr val="accent1">
+              <a:shade val="50000"/>
+            </a:schemeClr>
+          </a:lnRef>
+          <a:fillRef idx="1">
+            <a:schemeClr val="accent1"/>
+          </a:fillRef>
+          <a:effectRef idx="0">
+            <a:schemeClr val="accent1"/>
+          </a:effectRef>
+          <a:fontRef idx="minor">
+            <a:schemeClr val="lt1"/>
+          </a:fontRef>
+        </p:style>
+        <p:txBody>
+          <a:bodyPr rtlCol="0" anchor="ctr"/>
+          <a:lstStyle/>
+          <a:p>
+            <a:pPr algn="ctr"/>
+            <a:endParaRPr lang="en-US"/>
+          </a:p>
+        </p:txBody>
+      </p:sp>
+      <p:sp>
+        <p:nvSpPr>
+          <p:cNvPr id="27" name="Rectangle: Rounded Corners 26">
+            <a:extLst>
+              <a:ext uri="{FF2B5EF4-FFF2-40B4-BE49-F238E27FC236}">
+                <a16:creationId xmlns:a16="http://schemas.microsoft.com/office/drawing/2014/main" id="{4458A47F-3896-4B32-ACEC-2FEACF314A0E}"/>
+              </a:ext>
+            </a:extLst>
+          </p:cNvPr>
+          <p:cNvSpPr/>
+          <p:nvPr/>
+        </p:nvSpPr>
+        <p:spPr>
+          <a:xfrm>
+            <a:off x="146009" y="859502"/>
+            <a:ext cx="3035785" cy="274320"/>
+          </a:xfrm>
+          <a:prstGeom prst="roundRect">
+            <a:avLst/>
+          </a:prstGeom>
+          <a:solidFill>
+            <a:schemeClr val="tx1"/>
+          </a:solidFill>
+          <a:ln>
+            <a:solidFill>
+              <a:schemeClr val="tx1">
+                <a:lumMod val="65000"/>
+                <a:lumOff val="35000"/>
+              </a:schemeClr>
+            </a:solidFill>
+          </a:ln>
+        </p:spPr>
+        <p:style>
+          <a:lnRef idx="2">
+            <a:schemeClr val="accent1">
+              <a:shade val="50000"/>
+            </a:schemeClr>
+          </a:lnRef>
+          <a:fillRef idx="1">
+            <a:schemeClr val="accent1"/>
+          </a:fillRef>
+          <a:effectRef idx="0">
+            <a:schemeClr val="accent1"/>
+          </a:effectRef>
+          <a:fontRef idx="minor">
+            <a:schemeClr val="lt1"/>
+          </a:fontRef>
+        </p:style>
+        <p:txBody>
+          <a:bodyPr rtlCol="0" anchor="ctr"/>
+          <a:lstStyle/>
+          <a:p>
+            <a:pPr algn="ctr"/>
+            <a:r>
+              <a:rPr lang="en-US" b="1" dirty="0"/>
+              <a:t>Inputs</a:t>
+            </a:r>
+          </a:p>
+        </p:txBody>
+      </p:sp>
+      <p:sp>
+        <p:nvSpPr>
+          <p:cNvPr id="4" name="Rectangle: Rounded Corners 3">
+            <a:extLst>
+              <a:ext uri="{FF2B5EF4-FFF2-40B4-BE49-F238E27FC236}">
+                <a16:creationId xmlns:a16="http://schemas.microsoft.com/office/drawing/2014/main" id="{9E820235-A469-4A56-9583-68711E80DAA8}"/>
+              </a:ext>
+            </a:extLst>
+          </p:cNvPr>
+          <p:cNvSpPr/>
+          <p:nvPr/>
+        </p:nvSpPr>
+        <p:spPr>
+          <a:xfrm>
+            <a:off x="2285999" y="2345124"/>
+            <a:ext cx="8198827" cy="1369625"/>
+          </a:xfrm>
+          <a:prstGeom prst="roundRect">
+            <a:avLst/>
+          </a:prstGeom>
+          <a:gradFill flip="none" rotWithShape="1">
+            <a:gsLst>
+              <a:gs pos="25000">
+                <a:schemeClr val="accent1">
+                  <a:lumMod val="67000"/>
+                </a:schemeClr>
+              </a:gs>
+              <a:gs pos="63000">
+                <a:schemeClr val="accent1">
+                  <a:lumMod val="97000"/>
+                  <a:lumOff val="3000"/>
+                </a:schemeClr>
+              </a:gs>
+              <a:gs pos="94000">
+                <a:schemeClr val="accent1">
+                  <a:lumMod val="60000"/>
+                  <a:lumOff val="40000"/>
+                </a:schemeClr>
+              </a:gs>
+            </a:gsLst>
+            <a:lin ang="16200000" scaled="1"/>
+            <a:tileRect/>
+          </a:gradFill>
+          <a:effectLst>
+            <a:outerShdw blurRad="50800" dist="38100" dir="2700000" algn="tl" rotWithShape="0">
+              <a:prstClr val="black">
+                <a:alpha val="40000"/>
+              </a:prstClr>
+            </a:outerShdw>
+          </a:effectLst>
+        </p:spPr>
+        <p:style>
+          <a:lnRef idx="2">
+            <a:schemeClr val="accent1">
+              <a:shade val="50000"/>
+            </a:schemeClr>
+          </a:lnRef>
+          <a:fillRef idx="1">
+            <a:schemeClr val="accent1"/>
+          </a:fillRef>
+          <a:effectRef idx="0">
+            <a:schemeClr val="accent1"/>
+          </a:effectRef>
+          <a:fontRef idx="minor">
+            <a:schemeClr val="lt1"/>
+          </a:fontRef>
+        </p:style>
+        <p:txBody>
+          <a:bodyPr rtlCol="0" anchor="ctr"/>
+          <a:lstStyle/>
+          <a:p>
+            <a:pPr algn="ctr"/>
+            <a:r>
+              <a:rPr lang="en-US" sz="4800" dirty="0"/>
+              <a:t>Coming soon …</a:t>
+            </a:r>
+          </a:p>
+        </p:txBody>
+      </p:sp>
+      <p:sp>
+        <p:nvSpPr>
+          <p:cNvPr id="9" name="TextBox 8">
+            <a:extLst>
+              <a:ext uri="{FF2B5EF4-FFF2-40B4-BE49-F238E27FC236}">
+                <a16:creationId xmlns:a16="http://schemas.microsoft.com/office/drawing/2014/main" id="{E624FA1B-41A0-4B6A-9C3F-4821F66E2A63}"/>
+              </a:ext>
+            </a:extLst>
+          </p:cNvPr>
+          <p:cNvSpPr txBox="1"/>
+          <p:nvPr/>
+        </p:nvSpPr>
+        <p:spPr>
+          <a:xfrm>
+            <a:off x="351995" y="9124"/>
+            <a:ext cx="2520755" cy="461665"/>
+          </a:xfrm>
+          <a:prstGeom prst="rect">
+            <a:avLst/>
+          </a:prstGeom>
+          <a:noFill/>
+        </p:spPr>
+        <p:txBody>
+          <a:bodyPr wrap="square" rtlCol="0">
+            <a:spAutoFit/>
+          </a:bodyPr>
+          <a:lstStyle/>
+          <a:p>
+            <a:pPr algn="ctr"/>
+            <a:r>
+              <a:rPr lang="en-US" sz="2400" b="1" dirty="0" err="1"/>
+              <a:t>rmap</a:t>
+            </a:r>
+            <a:r>
+              <a:rPr lang="en-US" sz="2400" b="1" dirty="0"/>
+              <a:t> </a:t>
+            </a:r>
+            <a:r>
+              <a:rPr lang="en-US" sz="2000" dirty="0"/>
+              <a:t>Cheat Sheet</a:t>
+            </a:r>
+          </a:p>
+        </p:txBody>
+      </p:sp>
+      <p:sp>
+        <p:nvSpPr>
+          <p:cNvPr id="10" name="TextBox 9">
+            <a:extLst>
+              <a:ext uri="{FF2B5EF4-FFF2-40B4-BE49-F238E27FC236}">
+                <a16:creationId xmlns:a16="http://schemas.microsoft.com/office/drawing/2014/main" id="{008A730F-9F13-4A11-AEAE-F67277C7EE8B}"/>
+              </a:ext>
+            </a:extLst>
+          </p:cNvPr>
+          <p:cNvSpPr txBox="1"/>
+          <p:nvPr/>
+        </p:nvSpPr>
+        <p:spPr>
+          <a:xfrm>
+            <a:off x="341959" y="467335"/>
+            <a:ext cx="2532265" cy="246221"/>
+          </a:xfrm>
+          <a:prstGeom prst="rect">
+            <a:avLst/>
+          </a:prstGeom>
+          <a:noFill/>
+        </p:spPr>
+        <p:txBody>
+          <a:bodyPr wrap="square" rtlCol="0">
+            <a:spAutoFit/>
+          </a:bodyPr>
+          <a:lstStyle/>
+          <a:p>
+            <a:pPr algn="ctr"/>
+            <a:r>
+              <a:rPr lang="en-US" sz="1000" dirty="0">
+                <a:hlinkClick r:id="rId3"/>
+              </a:rPr>
+              <a:t>https://github.com/JGCRI/rmap</a:t>
+            </a:r>
+            <a:endParaRPr lang="en-US" sz="1000" dirty="0"/>
+          </a:p>
+        </p:txBody>
+      </p:sp>
+    </p:spTree>
+    <p:extLst>
+      <p:ext uri="{BB962C8B-B14F-4D97-AF65-F5344CB8AC3E}">
+        <p14:creationId xmlns:p14="http://schemas.microsoft.com/office/powerpoint/2010/main" val="963788966"/>
       </p:ext>
     </p:extLst>
   </p:cSld>

</xml_diff>

<commit_message>
Updating labels for shape_to_df
</commit_message>
<xml_diff>
--- a/inst/extras/cheatsheet.pptx
+++ b/inst/extras/cheatsheet.pptx
@@ -5,11 +5,10 @@
     <p:sldMasterId id="2147483648" r:id="rId1"/>
   </p:sldMasterIdLst>
   <p:notesMasterIdLst>
-    <p:notesMasterId r:id="rId4"/>
+    <p:notesMasterId r:id="rId3"/>
   </p:notesMasterIdLst>
   <p:sldIdLst>
     <p:sldId id="258" r:id="rId2"/>
-    <p:sldId id="259" r:id="rId3"/>
   </p:sldIdLst>
   <p:sldSz cx="12192000" cy="6858000"/>
   <p:notesSz cx="6858000" cy="9144000"/>
@@ -531,90 +530,6 @@
             <a:fld id="{43C70CDB-399F-4BF9-A069-67DDD871CA16}" type="slidenum">
               <a:rPr lang="en-US" smtClean="0"/>
               <a:t>1</a:t>
-            </a:fld>
-            <a:endParaRPr lang="en-US"/>
-          </a:p>
-        </p:txBody>
-      </p:sp>
-    </p:spTree>
-    <p:extLst>
-      <p:ext uri="{BB962C8B-B14F-4D97-AF65-F5344CB8AC3E}">
-        <p14:creationId xmlns:p14="http://schemas.microsoft.com/office/powerpoint/2010/main" val="3607993087"/>
-      </p:ext>
-    </p:extLst>
-  </p:cSld>
-  <p:clrMapOvr>
-    <a:masterClrMapping/>
-  </p:clrMapOvr>
-</p:notes>
-</file>
-
-<file path=ppt/notesSlides/notesSlide2.xml><?xml version="1.0" encoding="utf-8"?>
-<p:notes xmlns:a="http://schemas.openxmlformats.org/drawingml/2006/main" xmlns:r="http://schemas.openxmlformats.org/officeDocument/2006/relationships" xmlns:p="http://schemas.openxmlformats.org/presentationml/2006/main">
-  <p:cSld>
-    <p:spTree>
-      <p:nvGrpSpPr>
-        <p:cNvPr id="1" name=""/>
-        <p:cNvGrpSpPr/>
-        <p:nvPr/>
-      </p:nvGrpSpPr>
-      <p:grpSpPr>
-        <a:xfrm>
-          <a:off x="0" y="0"/>
-          <a:ext cx="0" cy="0"/>
-          <a:chOff x="0" y="0"/>
-          <a:chExt cx="0" cy="0"/>
-        </a:xfrm>
-      </p:grpSpPr>
-      <p:sp>
-        <p:nvSpPr>
-          <p:cNvPr id="2" name="Slide Image Placeholder 1"/>
-          <p:cNvSpPr>
-            <a:spLocks noGrp="1" noRot="1" noChangeAspect="1"/>
-          </p:cNvSpPr>
-          <p:nvPr>
-            <p:ph type="sldImg"/>
-          </p:nvPr>
-        </p:nvSpPr>
-        <p:spPr/>
-      </p:sp>
-      <p:sp>
-        <p:nvSpPr>
-          <p:cNvPr id="3" name="Notes Placeholder 2"/>
-          <p:cNvSpPr>
-            <a:spLocks noGrp="1"/>
-          </p:cNvSpPr>
-          <p:nvPr>
-            <p:ph type="body" idx="1"/>
-          </p:nvPr>
-        </p:nvSpPr>
-        <p:spPr/>
-        <p:txBody>
-          <a:bodyPr/>
-          <a:lstStyle/>
-          <a:p>
-            <a:endParaRPr lang="en-US"/>
-          </a:p>
-        </p:txBody>
-      </p:sp>
-      <p:sp>
-        <p:nvSpPr>
-          <p:cNvPr id="4" name="Slide Number Placeholder 3"/>
-          <p:cNvSpPr>
-            <a:spLocks noGrp="1"/>
-          </p:cNvSpPr>
-          <p:nvPr>
-            <p:ph type="sldNum" sz="quarter" idx="5"/>
-          </p:nvPr>
-        </p:nvSpPr>
-        <p:spPr/>
-        <p:txBody>
-          <a:bodyPr/>
-          <a:lstStyle/>
-          <a:p>
-            <a:fld id="{43C70CDB-399F-4BF9-A069-67DDD871CA16}" type="slidenum">
-              <a:rPr lang="en-US" smtClean="0"/>
-              <a:t>2</a:t>
             </a:fld>
             <a:endParaRPr lang="en-US"/>
           </a:p>
@@ -4064,7 +3979,7 @@
                   <a:schemeClr val="tx1"/>
                 </a:solidFill>
               </a:rPr>
-              <a:t> = c("TX", "AZ"), value = c(32, 54), year=c(2010,2010))</a:t>
+              <a:t> = c("TX", "AZ"), value = c(32, 54))</a:t>
             </a:r>
           </a:p>
           <a:p>
@@ -4079,7 +3994,31 @@
                   <a:schemeClr val="tx1"/>
                 </a:solidFill>
               </a:rPr>
-              <a:t>map(data)</a:t>
+              <a:t>map(data, </a:t>
+            </a:r>
+            <a:r>
+              <a:rPr lang="en-US" altLang="en-US" sz="800" dirty="0" err="1">
+                <a:solidFill>
+                  <a:srgbClr val="C00000"/>
+                </a:solidFill>
+              </a:rPr>
+              <a:t>underLayer</a:t>
+            </a:r>
+            <a:r>
+              <a:rPr lang="en-US" altLang="en-US" sz="800" dirty="0">
+                <a:solidFill>
+                  <a:srgbClr val="C00000"/>
+                </a:solidFill>
+              </a:rPr>
+              <a:t> = mapUS49</a:t>
+            </a:r>
+            <a:r>
+              <a:rPr lang="en-US" altLang="en-US" sz="800" dirty="0">
+                <a:solidFill>
+                  <a:schemeClr val="tx1"/>
+                </a:solidFill>
+              </a:rPr>
+              <a:t>)</a:t>
             </a:r>
           </a:p>
         </p:txBody>
@@ -4160,7 +4099,7 @@
         <p:spPr>
           <a:xfrm>
             <a:off x="146009" y="859502"/>
-            <a:ext cx="3035785" cy="274320"/>
+            <a:ext cx="3022921" cy="274320"/>
           </a:xfrm>
           <a:prstGeom prst="roundRect">
             <a:avLst/>
@@ -4219,7 +4158,7 @@
         </p:nvSpPr>
         <p:spPr>
           <a:xfrm>
-            <a:off x="230601" y="2872027"/>
+            <a:off x="203646" y="5187413"/>
             <a:ext cx="2799549" cy="890034"/>
           </a:xfrm>
           <a:prstGeom prst="roundRect">
@@ -4492,7 +4431,7 @@
                     <a:lstStyle/>
                     <a:p>
                       <a:r>
-                        <a:rPr lang="en-US" sz="800"/>
+                        <a:rPr lang="en-US" sz="800" dirty="0"/>
                         <a:t>TX</a:t>
                       </a:r>
                     </a:p>
@@ -4509,7 +4448,7 @@
                     <a:lstStyle/>
                     <a:p>
                       <a:r>
-                        <a:rPr lang="en-US" sz="800"/>
+                        <a:rPr lang="en-US" sz="800" dirty="0"/>
                         <a:t>32</a:t>
                       </a:r>
                     </a:p>
@@ -4550,7 +4489,7 @@
                     <a:lstStyle/>
                     <a:p>
                       <a:r>
-                        <a:rPr lang="en-US" sz="800"/>
+                        <a:rPr lang="en-US" sz="800" dirty="0"/>
                         <a:t>54</a:t>
                       </a:r>
                     </a:p>
@@ -4733,59 +4672,6 @@
       </p:sp>
       <p:sp>
         <p:nvSpPr>
-          <p:cNvPr id="114" name="TextBox 113">
-            <a:extLst>
-              <a:ext uri="{FF2B5EF4-FFF2-40B4-BE49-F238E27FC236}">
-                <a16:creationId xmlns:a16="http://schemas.microsoft.com/office/drawing/2014/main" id="{7A429D2B-368F-4253-9DFD-18E949B102D7}"/>
-              </a:ext>
-            </a:extLst>
-          </p:cNvPr>
-          <p:cNvSpPr txBox="1"/>
-          <p:nvPr/>
-        </p:nvSpPr>
-        <p:spPr>
-          <a:xfrm>
-            <a:off x="142289" y="4057587"/>
-            <a:ext cx="3008387" cy="278602"/>
-          </a:xfrm>
-          <a:prstGeom prst="rect">
-            <a:avLst/>
-          </a:prstGeom>
-          <a:noFill/>
-        </p:spPr>
-        <p:txBody>
-          <a:bodyPr wrap="square" rtlCol="0">
-            <a:spAutoFit/>
-          </a:bodyPr>
-          <a:lstStyle>
-            <a:defPPr>
-              <a:defRPr lang="en-US"/>
-            </a:defPPr>
-            <a:lvl1pPr>
-              <a:lnSpc>
-                <a:spcPct val="150000"/>
-              </a:lnSpc>
-              <a:defRPr sz="900">
-                <a:latin typeface="Consolas" panose="020B0609020204030204" pitchFamily="49" charset="0"/>
-              </a:defRPr>
-            </a:lvl1pPr>
-          </a:lstStyle>
-          <a:p>
-            <a:pPr marL="171450" indent="-171450">
-              <a:buFont typeface="Arial" panose="020B0604020202020204" pitchFamily="34" charset="0"/>
-              <a:buChar char="•"/>
-            </a:pPr>
-            <a:r>
-              <a:rPr lang="en-US" altLang="en-US">
-                <a:latin typeface="+mn-lt"/>
-              </a:rPr>
-              <a:t>Maps saved in the working directory as follows:</a:t>
-            </a:r>
-          </a:p>
-        </p:txBody>
-      </p:sp>
-      <p:sp>
-        <p:nvSpPr>
           <p:cNvPr id="143" name="TextBox 142">
             <a:extLst>
               <a:ext uri="{FF2B5EF4-FFF2-40B4-BE49-F238E27FC236}">
@@ -4837,8 +4723,8 @@
         </p:nvSpPr>
         <p:spPr>
           <a:xfrm>
-            <a:off x="206139" y="2574693"/>
-            <a:ext cx="452368" cy="230832"/>
+            <a:off x="229169" y="4892839"/>
+            <a:ext cx="832279" cy="230832"/>
           </a:xfrm>
           <a:prstGeom prst="rect">
             <a:avLst/>
@@ -4856,47 +4742,8 @@
           <a:lstStyle/>
           <a:p>
             <a:r>
-              <a:rPr lang="en-US" sz="900" b="1"/>
-              <a:t>CODE</a:t>
-            </a:r>
-          </a:p>
-        </p:txBody>
-      </p:sp>
-      <p:sp>
-        <p:nvSpPr>
-          <p:cNvPr id="145" name="TextBox 144">
-            <a:extLst>
-              <a:ext uri="{FF2B5EF4-FFF2-40B4-BE49-F238E27FC236}">
-                <a16:creationId xmlns:a16="http://schemas.microsoft.com/office/drawing/2014/main" id="{4B9622E5-D1BC-4CEA-97AB-568863E53EBC}"/>
-              </a:ext>
-            </a:extLst>
-          </p:cNvPr>
-          <p:cNvSpPr txBox="1"/>
-          <p:nvPr/>
-        </p:nvSpPr>
-        <p:spPr>
-          <a:xfrm>
-            <a:off x="206138" y="3862241"/>
-            <a:ext cx="848309" cy="230832"/>
-          </a:xfrm>
-          <a:prstGeom prst="rect">
-            <a:avLst/>
-          </a:prstGeom>
-          <a:solidFill>
-            <a:schemeClr val="bg1">
-              <a:lumMod val="75000"/>
-            </a:schemeClr>
-          </a:solidFill>
-        </p:spPr>
-        <p:txBody>
-          <a:bodyPr wrap="none" rtlCol="0">
-            <a:spAutoFit/>
-          </a:bodyPr>
-          <a:lstStyle/>
-          <a:p>
-            <a:r>
-              <a:rPr lang="en-US" sz="900" b="1"/>
-              <a:t>KEY OUTPUTS</a:t>
+              <a:rPr lang="en-US" sz="900" b="1" dirty="0"/>
+              <a:t>Simple Shape</a:t>
             </a:r>
           </a:p>
         </p:txBody>
@@ -5004,7 +4851,7 @@
                   <a:schemeClr val="tx1"/>
                 </a:solidFill>
               </a:rPr>
-              <a:t>data = data.frame(</a:t>
+              <a:t>data = </a:t>
             </a:r>
             <a:r>
               <a:rPr lang="en-US" altLang="en-US" sz="800" dirty="0" err="1">
@@ -5012,6 +4859,22 @@
                   <a:schemeClr val="tx1"/>
                 </a:solidFill>
               </a:rPr>
+              <a:t>data.frame</a:t>
+            </a:r>
+            <a:r>
+              <a:rPr lang="en-US" altLang="en-US" sz="800" dirty="0">
+                <a:solidFill>
+                  <a:schemeClr val="tx1"/>
+                </a:solidFill>
+              </a:rPr>
+              <a:t>(</a:t>
+            </a:r>
+            <a:r>
+              <a:rPr lang="en-US" altLang="en-US" sz="800" dirty="0" err="1">
+                <a:solidFill>
+                  <a:schemeClr val="tx1"/>
+                </a:solidFill>
+              </a:rPr>
               <a:t>subRegion</a:t>
             </a:r>
             <a:r>
@@ -5020,39 +4883,7 @@
                   <a:schemeClr val="tx1"/>
                 </a:solidFill>
               </a:rPr>
-              <a:t> = c(</a:t>
-            </a:r>
-            <a:r>
-              <a:rPr lang="en-US" altLang="en-US" sz="800" dirty="0">
-                <a:solidFill>
-                  <a:srgbClr val="C00000"/>
-                </a:solidFill>
-              </a:rPr>
-              <a:t>"</a:t>
-            </a:r>
-            <a:r>
-              <a:rPr lang="en-US" altLang="en-US" sz="800" dirty="0" err="1">
-                <a:solidFill>
-                  <a:srgbClr val="C00000"/>
-                </a:solidFill>
-              </a:rPr>
-              <a:t>India","China</a:t>
-            </a:r>
-            <a:r>
-              <a:rPr lang="en-US" altLang="en-US" sz="800" dirty="0">
-                <a:solidFill>
-                  <a:srgbClr val="C00000"/>
-                </a:solidFill>
-              </a:rPr>
-              <a:t>"</a:t>
-            </a:r>
-            <a:r>
-              <a:rPr lang="en-US" altLang="en-US" sz="800" dirty="0">
-                <a:solidFill>
-                  <a:schemeClr val="tx1"/>
-                </a:solidFill>
-              </a:rPr>
-              <a:t>), value = c(32,54))</a:t>
+              <a:t> = c("TX", "AZ"), value = c(32, 54))</a:t>
             </a:r>
           </a:p>
           <a:p>
@@ -5072,18 +4903,26 @@
             <a:r>
               <a:rPr lang="en-US" altLang="en-US" sz="800" dirty="0" err="1">
                 <a:solidFill>
+                  <a:schemeClr val="tx1"/>
+                </a:solidFill>
+              </a:rPr>
+              <a:t>underLayer</a:t>
+            </a:r>
+            <a:r>
+              <a:rPr lang="en-US" altLang="en-US" sz="800" dirty="0">
+                <a:solidFill>
+                  <a:schemeClr val="tx1"/>
+                </a:solidFill>
+              </a:rPr>
+              <a:t> = mapUS49, </a:t>
+            </a:r>
+            <a:r>
+              <a:rPr lang="en-US" altLang="en-US" sz="800" dirty="0">
+                <a:solidFill>
                   <a:srgbClr val="C00000"/>
                 </a:solidFill>
               </a:rPr>
-              <a:t>cropToBoundary</a:t>
-            </a:r>
-            <a:r>
-              <a:rPr lang="en-US" altLang="en-US" sz="800" dirty="0">
-                <a:solidFill>
-                  <a:srgbClr val="C00000"/>
-                </a:solidFill>
-              </a:rPr>
-              <a:t>=T</a:t>
+              <a:t>crop = F</a:t>
             </a:r>
             <a:r>
               <a:rPr lang="en-US" altLang="en-US" sz="800" dirty="0">
@@ -5149,8 +4988,8 @@
         </p:nvSpPr>
         <p:spPr>
           <a:xfrm>
-            <a:off x="8998719" y="672211"/>
-            <a:ext cx="3041861" cy="555612"/>
+            <a:off x="9232304" y="666080"/>
+            <a:ext cx="2753558" cy="555612"/>
           </a:xfrm>
           <a:prstGeom prst="roundRect">
             <a:avLst/>
@@ -5277,7 +5116,7 @@
                   <a:schemeClr val="tx1"/>
                 </a:solidFill>
               </a:rPr>
-              <a:t>map(data , </a:t>
+              <a:t>map(data, </a:t>
             </a:r>
             <a:r>
               <a:rPr lang="en-US" altLang="en-US" sz="800" dirty="0" err="1">
@@ -5285,15 +5124,31 @@
                   <a:schemeClr val="tx1"/>
                 </a:solidFill>
               </a:rPr>
-              <a:t>cropToBoundary</a:t>
-            </a:r>
-            <a:r>
-              <a:rPr lang="en-US" altLang="en-US" sz="800" dirty="0">
-                <a:solidFill>
-                  <a:schemeClr val="tx1"/>
-                </a:solidFill>
-              </a:rPr>
-              <a:t>=T)</a:t>
+              <a:t>underLayer</a:t>
+            </a:r>
+            <a:r>
+              <a:rPr lang="en-US" altLang="en-US" sz="800" dirty="0">
+                <a:solidFill>
+                  <a:schemeClr val="tx1"/>
+                </a:solidFill>
+              </a:rPr>
+              <a:t> = </a:t>
+            </a:r>
+            <a:r>
+              <a:rPr lang="en-US" altLang="en-US" sz="800" dirty="0" err="1">
+                <a:solidFill>
+                  <a:schemeClr val="tx1"/>
+                </a:solidFill>
+              </a:rPr>
+              <a:t>mapCountries</a:t>
+            </a:r>
+            <a:r>
+              <a:rPr lang="en-US" altLang="en-US" sz="800" dirty="0">
+                <a:solidFill>
+                  <a:schemeClr val="tx1"/>
+                </a:solidFill>
+              </a:rPr>
+              <a:t> )</a:t>
             </a:r>
           </a:p>
         </p:txBody>
@@ -5493,7 +5348,7 @@
                   <a:schemeClr val="tx1"/>
                 </a:solidFill>
               </a:rPr>
-              <a:t> = c("TX","TX", "AZ", "AZ"), </a:t>
+              <a:t> = c("TX","TX", "CA", "CA"), </a:t>
             </a:r>
           </a:p>
           <a:p>
@@ -5570,15 +5425,23 @@
                   <a:srgbClr val="C00000"/>
                 </a:solidFill>
               </a:rPr>
-              <a:t>="scen1"</a:t>
-            </a:r>
-            <a:r>
-              <a:rPr lang="en-US" altLang="en-US" sz="800" dirty="0">
-                <a:solidFill>
-                  <a:schemeClr val="tx1"/>
-                </a:solidFill>
-              </a:rPr>
-              <a:t>)</a:t>
+              <a:t>="scen1", </a:t>
+            </a:r>
+            <a:r>
+              <a:rPr lang="en-US" altLang="en-US" sz="800" dirty="0" err="1">
+                <a:solidFill>
+                  <a:schemeClr val="tx1"/>
+                </a:solidFill>
+              </a:rPr>
+              <a:t>underLayer</a:t>
+            </a:r>
+            <a:r>
+              <a:rPr lang="en-US" altLang="en-US" sz="800" dirty="0">
+                <a:solidFill>
+                  <a:schemeClr val="tx1"/>
+                </a:solidFill>
+              </a:rPr>
+              <a:t> =  mapUS49, crop=F)</a:t>
             </a:r>
           </a:p>
         </p:txBody>
@@ -5597,7 +5460,7 @@
         </p:nvSpPr>
         <p:spPr>
           <a:xfrm>
-            <a:off x="150643" y="2335276"/>
+            <a:off x="133168" y="2437957"/>
             <a:ext cx="2949846" cy="246221"/>
           </a:xfrm>
           <a:prstGeom prst="rect">
@@ -5611,7 +5474,7 @@
           <a:lstStyle/>
           <a:p>
             <a:r>
-              <a:rPr lang="en-US" altLang="en-US" sz="1000" b="1">
+              <a:rPr lang="en-US" altLang="en-US" sz="1000" b="1" dirty="0">
                 <a:solidFill>
                   <a:srgbClr val="29A33D"/>
                 </a:solidFill>
@@ -5619,10 +5482,10 @@
               <a:t>Optional Columns: </a:t>
             </a:r>
             <a:r>
-              <a:rPr lang="en-US" altLang="en-US" sz="1000"/>
+              <a:rPr lang="en-US" altLang="en-US" sz="1000" dirty="0"/>
               <a:t>param, scenario, year, class, units</a:t>
             </a:r>
-            <a:endParaRPr lang="en-US" sz="1000"/>
+            <a:endParaRPr lang="en-US" sz="1000" dirty="0"/>
           </a:p>
         </p:txBody>
       </p:sp>
@@ -5810,20 +5673,36 @@
               <a:t>map(data, </a:t>
             </a:r>
             <a:r>
+              <a:rPr lang="en-US" altLang="en-US" sz="800" dirty="0">
+                <a:solidFill>
+                  <a:srgbClr val="C00000"/>
+                </a:solidFill>
+              </a:rPr>
+              <a:t>folder="multiyear"</a:t>
+            </a:r>
+            <a:r>
+              <a:rPr lang="en-US" altLang="en-US" sz="800" dirty="0">
+                <a:solidFill>
+                  <a:schemeClr val="tx1"/>
+                </a:solidFill>
+              </a:rPr>
+              <a:t>, </a:t>
+            </a:r>
+            <a:r>
               <a:rPr lang="en-US" altLang="en-US" sz="800" dirty="0" err="1">
                 <a:solidFill>
                   <a:schemeClr val="tx1"/>
                 </a:solidFill>
               </a:rPr>
-              <a:t>folderName</a:t>
-            </a:r>
-            <a:r>
-              <a:rPr lang="en-US" altLang="en-US" sz="800" dirty="0">
-                <a:solidFill>
-                  <a:schemeClr val="tx1"/>
-                </a:solidFill>
-              </a:rPr>
-              <a:t>="multiyear")</a:t>
+              <a:t>underLyer</a:t>
+            </a:r>
+            <a:r>
+              <a:rPr lang="en-US" altLang="en-US" sz="800" dirty="0">
+                <a:solidFill>
+                  <a:schemeClr val="tx1"/>
+                </a:solidFill>
+              </a:rPr>
+              <a:t>=mapUS49, crop=F)</a:t>
             </a:r>
           </a:p>
         </p:txBody>
@@ -6016,7 +5895,23 @@
                   <a:schemeClr val="tx1"/>
                 </a:solidFill>
               </a:rPr>
-              <a:t>map(data)</a:t>
+              <a:t>map(data, </a:t>
+            </a:r>
+            <a:r>
+              <a:rPr lang="en-US" altLang="en-US" sz="800" dirty="0" err="1">
+                <a:solidFill>
+                  <a:schemeClr val="tx1"/>
+                </a:solidFill>
+              </a:rPr>
+              <a:t>underLayer</a:t>
+            </a:r>
+            <a:r>
+              <a:rPr lang="en-US" altLang="en-US" sz="800" dirty="0">
+                <a:solidFill>
+                  <a:schemeClr val="tx1"/>
+                </a:solidFill>
+              </a:rPr>
+              <a:t>=mapUS49, crop=F)</a:t>
             </a:r>
           </a:p>
         </p:txBody>
@@ -6263,6 +6158,22 @@
               </a:rPr>
               <a:t>map(data, </a:t>
             </a:r>
+            <a:r>
+              <a:rPr lang="en-US" altLang="en-US" sz="800" dirty="0" err="1">
+                <a:solidFill>
+                  <a:schemeClr val="tx1"/>
+                </a:solidFill>
+              </a:rPr>
+              <a:t>underLayer</a:t>
+            </a:r>
+            <a:r>
+              <a:rPr lang="en-US" altLang="en-US" sz="800" dirty="0">
+                <a:solidFill>
+                  <a:schemeClr val="tx1"/>
+                </a:solidFill>
+              </a:rPr>
+              <a:t> =  mapUS49, crop=F ,</a:t>
+            </a:r>
           </a:p>
           <a:p>
             <a:pPr>
@@ -6406,7 +6317,7 @@
         <p:spPr>
           <a:xfrm>
             <a:off x="10310765" y="4666858"/>
-            <a:ext cx="1130438" cy="230832"/>
+            <a:ext cx="756938" cy="230832"/>
           </a:xfrm>
           <a:prstGeom prst="rect">
             <a:avLst/>
@@ -6424,8 +6335,8 @@
           <a:lstStyle/>
           <a:p>
             <a:r>
-              <a:rPr lang="en-US" sz="900" b="1"/>
-              <a:t>Extended Boundary</a:t>
+              <a:rPr lang="en-US" sz="900" b="1" dirty="0"/>
+              <a:t>Background</a:t>
             </a:r>
           </a:p>
         </p:txBody>
@@ -6576,7 +6487,7 @@
             <a:r>
               <a:rPr lang="en-US" altLang="en-US" sz="800" dirty="0" err="1">
                 <a:solidFill>
-                  <a:schemeClr val="tx1"/>
+                  <a:srgbClr val="C00000"/>
                 </a:solidFill>
               </a:rPr>
               <a:t>scenRef</a:t>
@@ -6584,7 +6495,7 @@
             <a:r>
               <a:rPr lang="en-US" altLang="en-US" sz="800" dirty="0">
                 <a:solidFill>
-                  <a:schemeClr val="tx1"/>
+                  <a:srgbClr val="C00000"/>
                 </a:solidFill>
               </a:rPr>
               <a:t>=</a:t>
@@ -6603,7 +6514,23 @@
                   <a:schemeClr val="tx1"/>
                 </a:solidFill>
               </a:rPr>
-              <a:t>,</a:t>
+              <a:t>, </a:t>
+            </a:r>
+            <a:r>
+              <a:rPr lang="en-US" altLang="en-US" sz="800" dirty="0" err="1">
+                <a:solidFill>
+                  <a:schemeClr val="tx1"/>
+                </a:solidFill>
+              </a:rPr>
+              <a:t>underLayer</a:t>
+            </a:r>
+            <a:r>
+              <a:rPr lang="en-US" altLang="en-US" sz="800" dirty="0">
+                <a:solidFill>
+                  <a:schemeClr val="tx1"/>
+                </a:solidFill>
+              </a:rPr>
+              <a:t> =  mapUS49, crop=F,</a:t>
             </a:r>
           </a:p>
           <a:p>
@@ -6821,7 +6748,23 @@
                   <a:schemeClr val="tx1"/>
                 </a:solidFill>
               </a:rPr>
-              <a:t>map(data,</a:t>
+              <a:t>map(data, </a:t>
+            </a:r>
+            <a:r>
+              <a:rPr lang="en-US" altLang="en-US" sz="800" dirty="0" err="1">
+                <a:solidFill>
+                  <a:schemeClr val="tx1"/>
+                </a:solidFill>
+              </a:rPr>
+              <a:t>underLayer</a:t>
+            </a:r>
+            <a:r>
+              <a:rPr lang="en-US" altLang="en-US" sz="800" dirty="0">
+                <a:solidFill>
+                  <a:schemeClr val="tx1"/>
+                </a:solidFill>
+              </a:rPr>
+              <a:t> =  mapUS49, crop=F,</a:t>
             </a:r>
           </a:p>
           <a:p>
@@ -6851,10 +6794,10 @@
       </p:sp>
       <p:pic>
         <p:nvPicPr>
-          <p:cNvPr id="11" name="Picture 10">
-            <a:extLst>
-              <a:ext uri="{FF2B5EF4-FFF2-40B4-BE49-F238E27FC236}">
-                <a16:creationId xmlns:a16="http://schemas.microsoft.com/office/drawing/2014/main" id="{3626EF5F-BC0A-4A03-9BBB-DB59830B2091}"/>
+          <p:cNvPr id="21" name="Picture 20">
+            <a:extLst>
+              <a:ext uri="{FF2B5EF4-FFF2-40B4-BE49-F238E27FC236}">
+                <a16:creationId xmlns:a16="http://schemas.microsoft.com/office/drawing/2014/main" id="{2E7C1C53-A6FA-4BEA-8A9A-D09A8339EEA5}"/>
               </a:ext>
             </a:extLst>
           </p:cNvPr>
@@ -6865,302 +6808,6 @@
         </p:nvPicPr>
         <p:blipFill>
           <a:blip r:embed="rId3"/>
-          <a:stretch>
-            <a:fillRect/>
-          </a:stretch>
-        </p:blipFill>
-        <p:spPr>
-          <a:xfrm>
-            <a:off x="520833" y="5559303"/>
-            <a:ext cx="2095913" cy="1089365"/>
-          </a:xfrm>
-          <a:prstGeom prst="rect">
-            <a:avLst/>
-          </a:prstGeom>
-          <a:ln>
-            <a:solidFill>
-              <a:schemeClr val="bg1">
-                <a:lumMod val="65000"/>
-              </a:schemeClr>
-            </a:solidFill>
-          </a:ln>
-        </p:spPr>
-      </p:pic>
-      <p:pic>
-        <p:nvPicPr>
-          <p:cNvPr id="12" name="Picture 11">
-            <a:extLst>
-              <a:ext uri="{FF2B5EF4-FFF2-40B4-BE49-F238E27FC236}">
-                <a16:creationId xmlns:a16="http://schemas.microsoft.com/office/drawing/2014/main" id="{1E8FF741-86C0-4E33-A6E4-B76E7D589114}"/>
-              </a:ext>
-            </a:extLst>
-          </p:cNvPr>
-          <p:cNvPicPr>
-            <a:picLocks noChangeAspect="1"/>
-          </p:cNvPicPr>
-          <p:nvPr/>
-        </p:nvPicPr>
-        <p:blipFill>
-          <a:blip r:embed="rId4"/>
-          <a:stretch>
-            <a:fillRect/>
-          </a:stretch>
-        </p:blipFill>
-        <p:spPr>
-          <a:xfrm>
-            <a:off x="3881306" y="1296059"/>
-            <a:ext cx="1391739" cy="689781"/>
-          </a:xfrm>
-          <a:prstGeom prst="rect">
-            <a:avLst/>
-          </a:prstGeom>
-          <a:ln>
-            <a:solidFill>
-              <a:schemeClr val="bg1">
-                <a:lumMod val="65000"/>
-              </a:schemeClr>
-            </a:solidFill>
-          </a:ln>
-        </p:spPr>
-      </p:pic>
-      <p:pic>
-        <p:nvPicPr>
-          <p:cNvPr id="13" name="Picture 12">
-            <a:extLst>
-              <a:ext uri="{FF2B5EF4-FFF2-40B4-BE49-F238E27FC236}">
-                <a16:creationId xmlns:a16="http://schemas.microsoft.com/office/drawing/2014/main" id="{D4C1991D-2206-410C-B0DA-10D2C5B01E7E}"/>
-              </a:ext>
-            </a:extLst>
-          </p:cNvPr>
-          <p:cNvPicPr>
-            <a:picLocks noChangeAspect="1"/>
-          </p:cNvPicPr>
-          <p:nvPr/>
-        </p:nvPicPr>
-        <p:blipFill>
-          <a:blip r:embed="rId5"/>
-          <a:stretch>
-            <a:fillRect/>
-          </a:stretch>
-        </p:blipFill>
-        <p:spPr>
-          <a:xfrm>
-            <a:off x="6928319" y="1293324"/>
-            <a:ext cx="920282" cy="691268"/>
-          </a:xfrm>
-          <a:prstGeom prst="rect">
-            <a:avLst/>
-          </a:prstGeom>
-          <a:ln>
-            <a:solidFill>
-              <a:schemeClr val="bg1">
-                <a:lumMod val="65000"/>
-              </a:schemeClr>
-            </a:solidFill>
-          </a:ln>
-        </p:spPr>
-      </p:pic>
-      <p:pic>
-        <p:nvPicPr>
-          <p:cNvPr id="15" name="Picture 14">
-            <a:extLst>
-              <a:ext uri="{FF2B5EF4-FFF2-40B4-BE49-F238E27FC236}">
-                <a16:creationId xmlns:a16="http://schemas.microsoft.com/office/drawing/2014/main" id="{C3589189-12FF-4F0B-9AD2-5FFB4770B585}"/>
-              </a:ext>
-            </a:extLst>
-          </p:cNvPr>
-          <p:cNvPicPr>
-            <a:picLocks noChangeAspect="1"/>
-          </p:cNvPicPr>
-          <p:nvPr/>
-        </p:nvPicPr>
-        <p:blipFill>
-          <a:blip r:embed="rId6"/>
-          <a:stretch>
-            <a:fillRect/>
-          </a:stretch>
-        </p:blipFill>
-        <p:spPr>
-          <a:xfrm>
-            <a:off x="10154995" y="1290991"/>
-            <a:ext cx="671737" cy="691269"/>
-          </a:xfrm>
-          <a:prstGeom prst="rect">
-            <a:avLst/>
-          </a:prstGeom>
-          <a:ln>
-            <a:solidFill>
-              <a:schemeClr val="bg1">
-                <a:lumMod val="65000"/>
-              </a:schemeClr>
-            </a:solidFill>
-          </a:ln>
-        </p:spPr>
-      </p:pic>
-      <p:pic>
-        <p:nvPicPr>
-          <p:cNvPr id="16" name="Picture 15">
-            <a:extLst>
-              <a:ext uri="{FF2B5EF4-FFF2-40B4-BE49-F238E27FC236}">
-                <a16:creationId xmlns:a16="http://schemas.microsoft.com/office/drawing/2014/main" id="{CE8A2B8E-D75E-46ED-AB4C-19158EEDE9B9}"/>
-              </a:ext>
-            </a:extLst>
-          </p:cNvPr>
-          <p:cNvPicPr>
-            <a:picLocks noChangeAspect="1"/>
-          </p:cNvPicPr>
-          <p:nvPr/>
-        </p:nvPicPr>
-        <p:blipFill>
-          <a:blip r:embed="rId7"/>
-          <a:stretch>
-            <a:fillRect/>
-          </a:stretch>
-        </p:blipFill>
-        <p:spPr>
-          <a:xfrm>
-            <a:off x="3418299" y="3583201"/>
-            <a:ext cx="1162301" cy="691263"/>
-          </a:xfrm>
-          <a:prstGeom prst="rect">
-            <a:avLst/>
-          </a:prstGeom>
-          <a:ln>
-            <a:solidFill>
-              <a:schemeClr val="bg1">
-                <a:lumMod val="65000"/>
-              </a:schemeClr>
-            </a:solidFill>
-          </a:ln>
-        </p:spPr>
-      </p:pic>
-      <p:pic>
-        <p:nvPicPr>
-          <p:cNvPr id="17" name="Picture 16">
-            <a:extLst>
-              <a:ext uri="{FF2B5EF4-FFF2-40B4-BE49-F238E27FC236}">
-                <a16:creationId xmlns:a16="http://schemas.microsoft.com/office/drawing/2014/main" id="{CD97DC49-B811-4848-9E40-949524C300E3}"/>
-              </a:ext>
-            </a:extLst>
-          </p:cNvPr>
-          <p:cNvPicPr>
-            <a:picLocks noChangeAspect="1"/>
-          </p:cNvPicPr>
-          <p:nvPr/>
-        </p:nvPicPr>
-        <p:blipFill>
-          <a:blip r:embed="rId8"/>
-          <a:stretch>
-            <a:fillRect/>
-          </a:stretch>
-        </p:blipFill>
-        <p:spPr>
-          <a:xfrm>
-            <a:off x="4717427" y="3563553"/>
-            <a:ext cx="1328148" cy="691263"/>
-          </a:xfrm>
-          <a:prstGeom prst="rect">
-            <a:avLst/>
-          </a:prstGeom>
-          <a:ln>
-            <a:solidFill>
-              <a:schemeClr val="bg1">
-                <a:lumMod val="65000"/>
-              </a:schemeClr>
-            </a:solidFill>
-          </a:ln>
-        </p:spPr>
-      </p:pic>
-      <p:pic>
-        <p:nvPicPr>
-          <p:cNvPr id="19" name="Picture 18">
-            <a:extLst>
-              <a:ext uri="{FF2B5EF4-FFF2-40B4-BE49-F238E27FC236}">
-                <a16:creationId xmlns:a16="http://schemas.microsoft.com/office/drawing/2014/main" id="{57B7C8E6-75E6-47DC-AD1B-6322BE2C93A0}"/>
-              </a:ext>
-            </a:extLst>
-          </p:cNvPr>
-          <p:cNvPicPr>
-            <a:picLocks noChangeAspect="1"/>
-          </p:cNvPicPr>
-          <p:nvPr/>
-        </p:nvPicPr>
-        <p:blipFill>
-          <a:blip r:embed="rId9"/>
-          <a:stretch>
-            <a:fillRect/>
-          </a:stretch>
-        </p:blipFill>
-        <p:spPr>
-          <a:xfrm>
-            <a:off x="6381252" y="3544631"/>
-            <a:ext cx="2762415" cy="726325"/>
-          </a:xfrm>
-          <a:prstGeom prst="rect">
-            <a:avLst/>
-          </a:prstGeom>
-          <a:ln>
-            <a:solidFill>
-              <a:schemeClr val="bg1">
-                <a:lumMod val="65000"/>
-              </a:schemeClr>
-            </a:solidFill>
-          </a:ln>
-        </p:spPr>
-      </p:pic>
-      <p:pic>
-        <p:nvPicPr>
-          <p:cNvPr id="20" name="Picture 19">
-            <a:extLst>
-              <a:ext uri="{FF2B5EF4-FFF2-40B4-BE49-F238E27FC236}">
-                <a16:creationId xmlns:a16="http://schemas.microsoft.com/office/drawing/2014/main" id="{93419036-2DE8-4824-96F3-39409AE718A4}"/>
-              </a:ext>
-            </a:extLst>
-          </p:cNvPr>
-          <p:cNvPicPr>
-            <a:picLocks noChangeAspect="1"/>
-          </p:cNvPicPr>
-          <p:nvPr/>
-        </p:nvPicPr>
-        <p:blipFill>
-          <a:blip r:embed="rId10"/>
-          <a:stretch>
-            <a:fillRect/>
-          </a:stretch>
-        </p:blipFill>
-        <p:spPr>
-          <a:xfrm>
-            <a:off x="9399281" y="3544631"/>
-            <a:ext cx="2526077" cy="710185"/>
-          </a:xfrm>
-          <a:prstGeom prst="rect">
-            <a:avLst/>
-          </a:prstGeom>
-          <a:ln>
-            <a:solidFill>
-              <a:schemeClr val="bg1">
-                <a:lumMod val="65000"/>
-              </a:schemeClr>
-            </a:solidFill>
-          </a:ln>
-        </p:spPr>
-      </p:pic>
-      <p:pic>
-        <p:nvPicPr>
-          <p:cNvPr id="21" name="Picture 20">
-            <a:extLst>
-              <a:ext uri="{FF2B5EF4-FFF2-40B4-BE49-F238E27FC236}">
-                <a16:creationId xmlns:a16="http://schemas.microsoft.com/office/drawing/2014/main" id="{2E7C1C53-A6FA-4BEA-8A9A-D09A8339EEA5}"/>
-              </a:ext>
-            </a:extLst>
-          </p:cNvPr>
-          <p:cNvPicPr>
-            <a:picLocks noChangeAspect="1"/>
-          </p:cNvPicPr>
-          <p:nvPr/>
-        </p:nvPicPr>
-        <p:blipFill>
-          <a:blip r:embed="rId11"/>
           <a:stretch>
             <a:fillRect/>
           </a:stretch>
@@ -7197,7 +6844,7 @@
           <p:nvPr/>
         </p:nvPicPr>
         <p:blipFill>
-          <a:blip r:embed="rId12"/>
+          <a:blip r:embed="rId4"/>
           <a:stretch>
             <a:fillRect/>
           </a:stretch>
@@ -7234,7 +6881,7 @@
           <p:nvPr/>
         </p:nvPicPr>
         <p:blipFill>
-          <a:blip r:embed="rId13"/>
+          <a:blip r:embed="rId5"/>
           <a:stretch>
             <a:fillRect/>
           </a:stretch>
@@ -7271,7 +6918,7 @@
           <p:nvPr/>
         </p:nvPicPr>
         <p:blipFill>
-          <a:blip r:embed="rId14"/>
+          <a:blip r:embed="rId6"/>
           <a:stretch>
             <a:fillRect/>
           </a:stretch>
@@ -7308,7 +6955,7 @@
           <p:nvPr/>
         </p:nvPicPr>
         <p:blipFill>
-          <a:blip r:embed="rId15"/>
+          <a:blip r:embed="rId7"/>
           <a:stretch>
             <a:fillRect/>
           </a:stretch>
@@ -7345,7 +6992,7 @@
           <p:nvPr/>
         </p:nvPicPr>
         <p:blipFill>
-          <a:blip r:embed="rId16"/>
+          <a:blip r:embed="rId8"/>
           <a:stretch>
             <a:fillRect/>
           </a:stretch>
@@ -7382,7 +7029,7 @@
           <p:nvPr/>
         </p:nvPicPr>
         <p:blipFill>
-          <a:blip r:embed="rId17"/>
+          <a:blip r:embed="rId9"/>
           <a:stretch>
             <a:fillRect/>
           </a:stretch>
@@ -7462,8 +7109,8 @@
         </p:nvSpPr>
         <p:spPr>
           <a:xfrm>
-            <a:off x="341959" y="467335"/>
-            <a:ext cx="2532265" cy="246221"/>
+            <a:off x="133169" y="467335"/>
+            <a:ext cx="3048626" cy="307777"/>
           </a:xfrm>
           <a:prstGeom prst="rect">
             <a:avLst/>
@@ -7478,21 +7125,371 @@
           <a:p>
             <a:pPr algn="ctr"/>
             <a:r>
-              <a:rPr lang="en-US" sz="1000" dirty="0">
-                <a:hlinkClick r:id="rId18"/>
-              </a:rPr>
-              <a:t>https://github.com/JGCRI/rmap</a:t>
-            </a:r>
-            <a:endParaRPr lang="en-US" sz="1000" dirty="0"/>
-          </a:p>
-        </p:txBody>
-      </p:sp>
+              <a:rPr lang="en-US" sz="1400" dirty="0" err="1">
+                <a:hlinkClick r:id="rId10"/>
+              </a:rPr>
+              <a:t>Github</a:t>
+            </a:r>
+            <a:r>
+              <a:rPr lang="en-US" sz="1400" dirty="0"/>
+              <a:t>                    </a:t>
+            </a:r>
+            <a:r>
+              <a:rPr lang="en-US" sz="1400" dirty="0">
+                <a:hlinkClick r:id="rId11"/>
+              </a:rPr>
+              <a:t>User Guide</a:t>
+            </a:r>
+            <a:endParaRPr lang="en-US" sz="1400" dirty="0"/>
+          </a:p>
+        </p:txBody>
+      </p:sp>
+      <p:graphicFrame>
+        <p:nvGraphicFramePr>
+          <p:cNvPr id="53" name="Table 31">
+            <a:extLst>
+              <a:ext uri="{FF2B5EF4-FFF2-40B4-BE49-F238E27FC236}">
+                <a16:creationId xmlns:a16="http://schemas.microsoft.com/office/drawing/2014/main" id="{4027EE49-20C6-45DE-B749-DA39C8C99847}"/>
+              </a:ext>
+            </a:extLst>
+          </p:cNvPr>
+          <p:cNvGraphicFramePr>
+            <a:graphicFrameLocks noGrp="1"/>
+          </p:cNvGraphicFramePr>
+          <p:nvPr>
+            <p:extLst>
+              <p:ext uri="{D42A27DB-BD31-4B8C-83A1-F6EECF244321}">
+                <p14:modId xmlns:p14="http://schemas.microsoft.com/office/powerpoint/2010/main" val="3111082713"/>
+              </p:ext>
+            </p:extLst>
+          </p:nvPr>
+        </p:nvGraphicFramePr>
+        <p:xfrm>
+          <a:off x="229168" y="2766803"/>
+          <a:ext cx="1989246" cy="1066800"/>
+        </p:xfrm>
+        <a:graphic>
+          <a:graphicData uri="http://schemas.openxmlformats.org/drawingml/2006/table">
+            <a:tbl>
+              <a:tblPr firstRow="1" bandRow="1">
+                <a:tableStyleId>{5940675A-B579-460E-94D1-54222C63F5DA}</a:tableStyleId>
+              </a:tblPr>
+              <a:tblGrid>
+                <a:gridCol w="663082">
+                  <a:extLst>
+                    <a:ext uri="{9D8B030D-6E8A-4147-A177-3AD203B41FA5}">
+                      <a16:colId xmlns:a16="http://schemas.microsoft.com/office/drawing/2014/main" val="749713345"/>
+                    </a:ext>
+                  </a:extLst>
+                </a:gridCol>
+                <a:gridCol w="663082">
+                  <a:extLst>
+                    <a:ext uri="{9D8B030D-6E8A-4147-A177-3AD203B41FA5}">
+                      <a16:colId xmlns:a16="http://schemas.microsoft.com/office/drawing/2014/main" val="857475453"/>
+                    </a:ext>
+                  </a:extLst>
+                </a:gridCol>
+                <a:gridCol w="663082">
+                  <a:extLst>
+                    <a:ext uri="{9D8B030D-6E8A-4147-A177-3AD203B41FA5}">
+                      <a16:colId xmlns:a16="http://schemas.microsoft.com/office/drawing/2014/main" val="1967939376"/>
+                    </a:ext>
+                  </a:extLst>
+                </a:gridCol>
+              </a:tblGrid>
+              <a:tr h="173076">
+                <a:tc>
+                  <a:txBody>
+                    <a:bodyPr/>
+                    <a:lstStyle/>
+                    <a:p>
+                      <a:r>
+                        <a:rPr lang="en-US" sz="800" dirty="0"/>
+                        <a:t>lat</a:t>
+                      </a:r>
+                    </a:p>
+                  </a:txBody>
+                  <a:tcPr>
+                    <a:solidFill>
+                      <a:schemeClr val="bg1"/>
+                    </a:solidFill>
+                  </a:tcPr>
+                </a:tc>
+                <a:tc>
+                  <a:txBody>
+                    <a:bodyPr/>
+                    <a:lstStyle/>
+                    <a:p>
+                      <a:r>
+                        <a:rPr lang="en-US" sz="800" dirty="0" err="1"/>
+                        <a:t>lon</a:t>
+                      </a:r>
+                      <a:endParaRPr lang="en-US" sz="800" dirty="0"/>
+                    </a:p>
+                  </a:txBody>
+                  <a:tcPr>
+                    <a:solidFill>
+                      <a:schemeClr val="bg1"/>
+                    </a:solidFill>
+                  </a:tcPr>
+                </a:tc>
+                <a:tc>
+                  <a:txBody>
+                    <a:bodyPr/>
+                    <a:lstStyle/>
+                    <a:p>
+                      <a:r>
+                        <a:rPr lang="en-US" sz="800" dirty="0"/>
+                        <a:t>value</a:t>
+                      </a:r>
+                    </a:p>
+                  </a:txBody>
+                  <a:tcPr>
+                    <a:solidFill>
+                      <a:schemeClr val="bg1"/>
+                    </a:solidFill>
+                  </a:tcPr>
+                </a:tc>
+                <a:extLst>
+                  <a:ext uri="{0D108BD9-81ED-4DB2-BD59-A6C34878D82A}">
+                    <a16:rowId xmlns:a16="http://schemas.microsoft.com/office/drawing/2014/main" val="2524014827"/>
+                  </a:ext>
+                </a:extLst>
+              </a:tr>
+              <a:tr h="173076">
+                <a:tc>
+                  <a:txBody>
+                    <a:bodyPr/>
+                    <a:lstStyle/>
+                    <a:p>
+                      <a:r>
+                        <a:rPr lang="en-US" sz="800" dirty="0"/>
+                        <a:t>65.2</a:t>
+                      </a:r>
+                    </a:p>
+                  </a:txBody>
+                  <a:tcPr>
+                    <a:solidFill>
+                      <a:schemeClr val="bg1"/>
+                    </a:solidFill>
+                  </a:tcPr>
+                </a:tc>
+                <a:tc>
+                  <a:txBody>
+                    <a:bodyPr/>
+                    <a:lstStyle/>
+                    <a:p>
+                      <a:r>
+                        <a:rPr lang="en-US" sz="800" dirty="0"/>
+                        <a:t>-180</a:t>
+                      </a:r>
+                    </a:p>
+                  </a:txBody>
+                  <a:tcPr>
+                    <a:solidFill>
+                      <a:schemeClr val="bg1"/>
+                    </a:solidFill>
+                  </a:tcPr>
+                </a:tc>
+                <a:tc>
+                  <a:txBody>
+                    <a:bodyPr/>
+                    <a:lstStyle/>
+                    <a:p>
+                      <a:r>
+                        <a:rPr lang="en-US" sz="800"/>
+                        <a:t>32</a:t>
+                      </a:r>
+                      <a:endParaRPr lang="en-US" sz="800" dirty="0"/>
+                    </a:p>
+                  </a:txBody>
+                  <a:tcPr>
+                    <a:solidFill>
+                      <a:schemeClr val="bg1"/>
+                    </a:solidFill>
+                  </a:tcPr>
+                </a:tc>
+                <a:extLst>
+                  <a:ext uri="{0D108BD9-81ED-4DB2-BD59-A6C34878D82A}">
+                    <a16:rowId xmlns:a16="http://schemas.microsoft.com/office/drawing/2014/main" val="4111607564"/>
+                  </a:ext>
+                </a:extLst>
+              </a:tr>
+              <a:tr h="173076">
+                <a:tc>
+                  <a:txBody>
+                    <a:bodyPr/>
+                    <a:lstStyle/>
+                    <a:p>
+                      <a:r>
+                        <a:rPr lang="en-US" sz="800" dirty="0"/>
+                        <a:t>65.8</a:t>
+                      </a:r>
+                    </a:p>
+                  </a:txBody>
+                  <a:tcPr>
+                    <a:solidFill>
+                      <a:schemeClr val="bg1"/>
+                    </a:solidFill>
+                  </a:tcPr>
+                </a:tc>
+                <a:tc>
+                  <a:txBody>
+                    <a:bodyPr/>
+                    <a:lstStyle/>
+                    <a:p>
+                      <a:r>
+                        <a:rPr lang="en-US" sz="800" dirty="0"/>
+                        <a:t>-180</a:t>
+                      </a:r>
+                    </a:p>
+                  </a:txBody>
+                  <a:tcPr>
+                    <a:solidFill>
+                      <a:schemeClr val="bg1"/>
+                    </a:solidFill>
+                  </a:tcPr>
+                </a:tc>
+                <a:tc>
+                  <a:txBody>
+                    <a:bodyPr/>
+                    <a:lstStyle/>
+                    <a:p>
+                      <a:r>
+                        <a:rPr lang="en-US" sz="800" dirty="0"/>
+                        <a:t>54</a:t>
+                      </a:r>
+                    </a:p>
+                  </a:txBody>
+                  <a:tcPr>
+                    <a:solidFill>
+                      <a:schemeClr val="bg1"/>
+                    </a:solidFill>
+                  </a:tcPr>
+                </a:tc>
+                <a:extLst>
+                  <a:ext uri="{0D108BD9-81ED-4DB2-BD59-A6C34878D82A}">
+                    <a16:rowId xmlns:a16="http://schemas.microsoft.com/office/drawing/2014/main" val="511747718"/>
+                  </a:ext>
+                </a:extLst>
+              </a:tr>
+              <a:tr h="173076">
+                <a:tc>
+                  <a:txBody>
+                    <a:bodyPr/>
+                    <a:lstStyle/>
+                    <a:p>
+                      <a:r>
+                        <a:rPr lang="en-US" sz="800" dirty="0"/>
+                        <a:t>50</a:t>
+                      </a:r>
+                    </a:p>
+                  </a:txBody>
+                  <a:tcPr>
+                    <a:solidFill>
+                      <a:schemeClr val="bg1"/>
+                    </a:solidFill>
+                  </a:tcPr>
+                </a:tc>
+                <a:tc>
+                  <a:txBody>
+                    <a:bodyPr/>
+                    <a:lstStyle/>
+                    <a:p>
+                      <a:r>
+                        <a:rPr lang="en-US" sz="800" dirty="0"/>
+                        <a:t>-175</a:t>
+                      </a:r>
+                    </a:p>
+                  </a:txBody>
+                  <a:tcPr>
+                    <a:solidFill>
+                      <a:schemeClr val="bg1"/>
+                    </a:solidFill>
+                  </a:tcPr>
+                </a:tc>
+                <a:tc>
+                  <a:txBody>
+                    <a:bodyPr/>
+                    <a:lstStyle/>
+                    <a:p>
+                      <a:endParaRPr lang="en-US" sz="800" dirty="0"/>
+                    </a:p>
+                  </a:txBody>
+                  <a:tcPr>
+                    <a:solidFill>
+                      <a:schemeClr val="bg1"/>
+                    </a:solidFill>
+                  </a:tcPr>
+                </a:tc>
+                <a:extLst>
+                  <a:ext uri="{0D108BD9-81ED-4DB2-BD59-A6C34878D82A}">
+                    <a16:rowId xmlns:a16="http://schemas.microsoft.com/office/drawing/2014/main" val="1289004448"/>
+                  </a:ext>
+                </a:extLst>
+              </a:tr>
+              <a:tr h="173076">
+                <a:tc>
+                  <a:txBody>
+                    <a:bodyPr/>
+                    <a:lstStyle/>
+                    <a:p>
+                      <a:r>
+                        <a:rPr lang="en-US" sz="800" dirty="0"/>
+                        <a:t>55</a:t>
+                      </a:r>
+                    </a:p>
+                  </a:txBody>
+                  <a:tcPr>
+                    <a:solidFill>
+                      <a:schemeClr val="bg1"/>
+                    </a:solidFill>
+                  </a:tcPr>
+                </a:tc>
+                <a:tc>
+                  <a:txBody>
+                    <a:bodyPr/>
+                    <a:lstStyle/>
+                    <a:p>
+                      <a:endParaRPr lang="en-US" sz="800" dirty="0"/>
+                    </a:p>
+                  </a:txBody>
+                  <a:tcPr>
+                    <a:solidFill>
+                      <a:schemeClr val="bg1"/>
+                    </a:solidFill>
+                  </a:tcPr>
+                </a:tc>
+                <a:tc>
+                  <a:txBody>
+                    <a:bodyPr/>
+                    <a:lstStyle/>
+                    <a:p>
+                      <a:endParaRPr lang="en-US" sz="800" dirty="0"/>
+                    </a:p>
+                  </a:txBody>
+                  <a:tcPr>
+                    <a:solidFill>
+                      <a:schemeClr val="bg1"/>
+                    </a:solidFill>
+                  </a:tcPr>
+                </a:tc>
+                <a:extLst>
+                  <a:ext uri="{0D108BD9-81ED-4DB2-BD59-A6C34878D82A}">
+                    <a16:rowId xmlns:a16="http://schemas.microsoft.com/office/drawing/2014/main" val="3518660072"/>
+                  </a:ext>
+                </a:extLst>
+              </a:tr>
+            </a:tbl>
+          </a:graphicData>
+        </a:graphic>
+      </p:graphicFrame>
       <p:pic>
         <p:nvPicPr>
-          <p:cNvPr id="2" name="Picture 1">
-            <a:extLst>
-              <a:ext uri="{FF2B5EF4-FFF2-40B4-BE49-F238E27FC236}">
-                <a16:creationId xmlns:a16="http://schemas.microsoft.com/office/drawing/2014/main" id="{C551FE01-49C6-4A57-BB88-C3A3B9D8C257}"/>
+          <p:cNvPr id="5" name="Picture 4" descr="Chart, histogram&#10;&#10;Description automatically generated">
+            <a:extLst>
+              <a:ext uri="{FF2B5EF4-FFF2-40B4-BE49-F238E27FC236}">
+                <a16:creationId xmlns:a16="http://schemas.microsoft.com/office/drawing/2014/main" id="{D24D4823-AD49-47FC-8A49-1DC2DD9D124F}"/>
               </a:ext>
             </a:extLst>
           </p:cNvPr>
@@ -7501,15 +7498,274 @@
           </p:cNvPicPr>
           <p:nvPr/>
         </p:nvPicPr>
-        <p:blipFill rotWithShape="1">
-          <a:blip r:embed="rId19"/>
-          <a:srcRect l="5370" t="4848" r="13191" b="12677"/>
-          <a:stretch/>
+        <p:blipFill>
+          <a:blip r:embed="rId12">
+            <a:extLst>
+              <a:ext uri="{28A0092B-C50C-407E-A947-70E740481C1C}">
+                <a14:useLocalDpi xmlns:a14="http://schemas.microsoft.com/office/drawing/2010/main" val="0"/>
+              </a:ext>
+            </a:extLst>
+          </a:blip>
+          <a:stretch>
+            <a:fillRect/>
+          </a:stretch>
         </p:blipFill>
         <p:spPr>
           <a:xfrm>
-            <a:off x="530102" y="4383617"/>
-            <a:ext cx="2095913" cy="989984"/>
+            <a:off x="3881653" y="1291907"/>
+            <a:ext cx="1284797" cy="707250"/>
+          </a:xfrm>
+          <a:prstGeom prst="rect">
+            <a:avLst/>
+          </a:prstGeom>
+          <a:ln>
+            <a:solidFill>
+              <a:schemeClr val="bg1">
+                <a:lumMod val="65000"/>
+              </a:schemeClr>
+            </a:solidFill>
+          </a:ln>
+        </p:spPr>
+      </p:pic>
+      <p:pic>
+        <p:nvPicPr>
+          <p:cNvPr id="7" name="Picture 6" descr="Map&#10;&#10;Description automatically generated">
+            <a:extLst>
+              <a:ext uri="{FF2B5EF4-FFF2-40B4-BE49-F238E27FC236}">
+                <a16:creationId xmlns:a16="http://schemas.microsoft.com/office/drawing/2014/main" id="{BEC30D68-8CA3-421A-8FDD-55BD26023AEB}"/>
+              </a:ext>
+            </a:extLst>
+          </p:cNvPr>
+          <p:cNvPicPr>
+            <a:picLocks noChangeAspect="1"/>
+          </p:cNvPicPr>
+          <p:nvPr/>
+        </p:nvPicPr>
+        <p:blipFill>
+          <a:blip r:embed="rId13">
+            <a:extLst>
+              <a:ext uri="{28A0092B-C50C-407E-A947-70E740481C1C}">
+                <a14:useLocalDpi xmlns:a14="http://schemas.microsoft.com/office/drawing/2010/main" val="0"/>
+              </a:ext>
+            </a:extLst>
+          </a:blip>
+          <a:stretch>
+            <a:fillRect/>
+          </a:stretch>
+        </p:blipFill>
+        <p:spPr>
+          <a:xfrm>
+            <a:off x="6525192" y="1262328"/>
+            <a:ext cx="1636721" cy="746657"/>
+          </a:xfrm>
+          <a:prstGeom prst="rect">
+            <a:avLst/>
+          </a:prstGeom>
+          <a:ln>
+            <a:solidFill>
+              <a:schemeClr val="bg1">
+                <a:lumMod val="65000"/>
+              </a:schemeClr>
+            </a:solidFill>
+          </a:ln>
+        </p:spPr>
+      </p:pic>
+      <p:pic>
+        <p:nvPicPr>
+          <p:cNvPr id="9" name="Picture 8" descr="Map&#10;&#10;Description automatically generated">
+            <a:extLst>
+              <a:ext uri="{FF2B5EF4-FFF2-40B4-BE49-F238E27FC236}">
+                <a16:creationId xmlns:a16="http://schemas.microsoft.com/office/drawing/2014/main" id="{9135FED7-3D7C-420D-B51C-315410291BB8}"/>
+              </a:ext>
+            </a:extLst>
+          </p:cNvPr>
+          <p:cNvPicPr>
+            <a:picLocks noChangeAspect="1"/>
+          </p:cNvPicPr>
+          <p:nvPr/>
+        </p:nvPicPr>
+        <p:blipFill>
+          <a:blip r:embed="rId14">
+            <a:extLst>
+              <a:ext uri="{28A0092B-C50C-407E-A947-70E740481C1C}">
+                <a14:useLocalDpi xmlns:a14="http://schemas.microsoft.com/office/drawing/2010/main" val="0"/>
+              </a:ext>
+            </a:extLst>
+          </a:blip>
+          <a:stretch>
+            <a:fillRect/>
+          </a:stretch>
+        </p:blipFill>
+        <p:spPr>
+          <a:xfrm>
+            <a:off x="10207215" y="1271759"/>
+            <a:ext cx="624868" cy="723785"/>
+          </a:xfrm>
+          <a:prstGeom prst="rect">
+            <a:avLst/>
+          </a:prstGeom>
+          <a:ln>
+            <a:solidFill>
+              <a:schemeClr val="bg1">
+                <a:lumMod val="65000"/>
+              </a:schemeClr>
+            </a:solidFill>
+          </a:ln>
+        </p:spPr>
+      </p:pic>
+      <p:pic>
+        <p:nvPicPr>
+          <p:cNvPr id="14" name="Picture 13" descr="Map&#10;&#10;Description automatically generated">
+            <a:extLst>
+              <a:ext uri="{FF2B5EF4-FFF2-40B4-BE49-F238E27FC236}">
+                <a16:creationId xmlns:a16="http://schemas.microsoft.com/office/drawing/2014/main" id="{4D302D2A-B570-49CB-AAE2-74B8598C7730}"/>
+              </a:ext>
+            </a:extLst>
+          </p:cNvPr>
+          <p:cNvPicPr>
+            <a:picLocks noChangeAspect="1"/>
+          </p:cNvPicPr>
+          <p:nvPr/>
+        </p:nvPicPr>
+        <p:blipFill>
+          <a:blip r:embed="rId15">
+            <a:extLst>
+              <a:ext uri="{28A0092B-C50C-407E-A947-70E740481C1C}">
+                <a14:useLocalDpi xmlns:a14="http://schemas.microsoft.com/office/drawing/2010/main" val="0"/>
+              </a:ext>
+            </a:extLst>
+          </a:blip>
+          <a:stretch>
+            <a:fillRect/>
+          </a:stretch>
+        </p:blipFill>
+        <p:spPr>
+          <a:xfrm>
+            <a:off x="4540989" y="3561168"/>
+            <a:ext cx="1444370" cy="711180"/>
+          </a:xfrm>
+          <a:prstGeom prst="rect">
+            <a:avLst/>
+          </a:prstGeom>
+          <a:ln>
+            <a:solidFill>
+              <a:schemeClr val="bg1">
+                <a:lumMod val="65000"/>
+              </a:schemeClr>
+            </a:solidFill>
+          </a:ln>
+        </p:spPr>
+      </p:pic>
+      <p:pic>
+        <p:nvPicPr>
+          <p:cNvPr id="18" name="Picture 17">
+            <a:extLst>
+              <a:ext uri="{FF2B5EF4-FFF2-40B4-BE49-F238E27FC236}">
+                <a16:creationId xmlns:a16="http://schemas.microsoft.com/office/drawing/2014/main" id="{BD3DBA8C-02EF-4186-9094-8D64DEC4FA3C}"/>
+              </a:ext>
+            </a:extLst>
+          </p:cNvPr>
+          <p:cNvPicPr>
+            <a:picLocks noChangeAspect="1"/>
+          </p:cNvPicPr>
+          <p:nvPr/>
+        </p:nvPicPr>
+        <p:blipFill>
+          <a:blip r:embed="rId16"/>
+          <a:stretch>
+            <a:fillRect/>
+          </a:stretch>
+        </p:blipFill>
+        <p:spPr>
+          <a:xfrm>
+            <a:off x="3452558" y="3546217"/>
+            <a:ext cx="968122" cy="727716"/>
+          </a:xfrm>
+          <a:prstGeom prst="rect">
+            <a:avLst/>
+          </a:prstGeom>
+          <a:ln>
+            <a:solidFill>
+              <a:schemeClr val="bg1">
+                <a:lumMod val="65000"/>
+              </a:schemeClr>
+            </a:solidFill>
+          </a:ln>
+        </p:spPr>
+      </p:pic>
+      <p:pic>
+        <p:nvPicPr>
+          <p:cNvPr id="29" name="Picture 28" descr="A picture containing diagram&#10;&#10;Description automatically generated">
+            <a:extLst>
+              <a:ext uri="{FF2B5EF4-FFF2-40B4-BE49-F238E27FC236}">
+                <a16:creationId xmlns:a16="http://schemas.microsoft.com/office/drawing/2014/main" id="{34B73B45-CC3C-4F3B-A410-BBFF7B6ED98D}"/>
+              </a:ext>
+            </a:extLst>
+          </p:cNvPr>
+          <p:cNvPicPr>
+            <a:picLocks noChangeAspect="1"/>
+          </p:cNvPicPr>
+          <p:nvPr/>
+        </p:nvPicPr>
+        <p:blipFill>
+          <a:blip r:embed="rId17">
+            <a:extLst>
+              <a:ext uri="{28A0092B-C50C-407E-A947-70E740481C1C}">
+                <a14:useLocalDpi xmlns:a14="http://schemas.microsoft.com/office/drawing/2010/main" val="0"/>
+              </a:ext>
+            </a:extLst>
+          </a:blip>
+          <a:stretch>
+            <a:fillRect/>
+          </a:stretch>
+        </p:blipFill>
+        <p:spPr>
+          <a:xfrm>
+            <a:off x="6434630" y="3559380"/>
+            <a:ext cx="2673383" cy="705264"/>
+          </a:xfrm>
+          <a:prstGeom prst="rect">
+            <a:avLst/>
+          </a:prstGeom>
+          <a:ln>
+            <a:solidFill>
+              <a:schemeClr val="bg1">
+                <a:lumMod val="65000"/>
+              </a:schemeClr>
+            </a:solidFill>
+          </a:ln>
+        </p:spPr>
+      </p:pic>
+      <p:pic>
+        <p:nvPicPr>
+          <p:cNvPr id="34" name="Picture 33" descr="A picture containing diagram&#10;&#10;Description automatically generated">
+            <a:extLst>
+              <a:ext uri="{FF2B5EF4-FFF2-40B4-BE49-F238E27FC236}">
+                <a16:creationId xmlns:a16="http://schemas.microsoft.com/office/drawing/2014/main" id="{8FA54E96-D364-43C6-9DB3-E13E724EE48D}"/>
+              </a:ext>
+            </a:extLst>
+          </p:cNvPr>
+          <p:cNvPicPr>
+            <a:picLocks noChangeAspect="1"/>
+          </p:cNvPicPr>
+          <p:nvPr/>
+        </p:nvPicPr>
+        <p:blipFill>
+          <a:blip r:embed="rId18">
+            <a:extLst>
+              <a:ext uri="{28A0092B-C50C-407E-A947-70E740481C1C}">
+                <a14:useLocalDpi xmlns:a14="http://schemas.microsoft.com/office/drawing/2010/main" val="0"/>
+              </a:ext>
+            </a:extLst>
+          </a:blip>
+          <a:stretch>
+            <a:fillRect/>
+          </a:stretch>
+        </p:blipFill>
+        <p:spPr>
+          <a:xfrm>
+            <a:off x="9338779" y="3554838"/>
+            <a:ext cx="2628105" cy="693319"/>
           </a:xfrm>
           <a:prstGeom prst="rect">
             <a:avLst/>
@@ -7527,440 +7783,6 @@
     <p:extLst>
       <p:ext uri="{BB962C8B-B14F-4D97-AF65-F5344CB8AC3E}">
         <p14:creationId xmlns:p14="http://schemas.microsoft.com/office/powerpoint/2010/main" val="2059046414"/>
-      </p:ext>
-    </p:extLst>
-  </p:cSld>
-  <p:clrMapOvr>
-    <a:masterClrMapping/>
-  </p:clrMapOvr>
-</p:sld>
-</file>
-
-<file path=ppt/slides/slide2.xml><?xml version="1.0" encoding="utf-8"?>
-<p:sld xmlns:a="http://schemas.openxmlformats.org/drawingml/2006/main" xmlns:r="http://schemas.openxmlformats.org/officeDocument/2006/relationships" xmlns:p="http://schemas.openxmlformats.org/presentationml/2006/main">
-  <p:cSld>
-    <p:spTree>
-      <p:nvGrpSpPr>
-        <p:cNvPr id="1" name=""/>
-        <p:cNvGrpSpPr/>
-        <p:nvPr/>
-      </p:nvGrpSpPr>
-      <p:grpSpPr>
-        <a:xfrm>
-          <a:off x="0" y="0"/>
-          <a:ext cx="0" cy="0"/>
-          <a:chOff x="0" y="0"/>
-          <a:chExt cx="0" cy="0"/>
-        </a:xfrm>
-      </p:grpSpPr>
-      <p:sp>
-        <p:nvSpPr>
-          <p:cNvPr id="75" name="Rectangle: Rounded Corners 74">
-            <a:extLst>
-              <a:ext uri="{FF2B5EF4-FFF2-40B4-BE49-F238E27FC236}">
-                <a16:creationId xmlns:a16="http://schemas.microsoft.com/office/drawing/2014/main" id="{D39E3418-1558-4C4B-A4F7-774C7CBE38E4}"/>
-              </a:ext>
-            </a:extLst>
-          </p:cNvPr>
-          <p:cNvSpPr/>
-          <p:nvPr/>
-        </p:nvSpPr>
-        <p:spPr>
-          <a:xfrm>
-            <a:off x="3302167" y="66676"/>
-            <a:ext cx="8748574" cy="6695199"/>
-          </a:xfrm>
-          <a:prstGeom prst="roundRect">
-            <a:avLst>
-              <a:gd name="adj" fmla="val 4514"/>
-            </a:avLst>
-          </a:prstGeom>
-          <a:solidFill>
-            <a:schemeClr val="accent4">
-              <a:lumMod val="20000"/>
-              <a:lumOff val="80000"/>
-            </a:schemeClr>
-          </a:solidFill>
-          <a:ln>
-            <a:solidFill>
-              <a:schemeClr val="bg1">
-                <a:lumMod val="65000"/>
-              </a:schemeClr>
-            </a:solidFill>
-          </a:ln>
-        </p:spPr>
-        <p:style>
-          <a:lnRef idx="2">
-            <a:schemeClr val="accent1">
-              <a:shade val="50000"/>
-            </a:schemeClr>
-          </a:lnRef>
-          <a:fillRef idx="1">
-            <a:schemeClr val="accent1"/>
-          </a:fillRef>
-          <a:effectRef idx="0">
-            <a:schemeClr val="accent1"/>
-          </a:effectRef>
-          <a:fontRef idx="minor">
-            <a:schemeClr val="lt1"/>
-          </a:fontRef>
-        </p:style>
-        <p:txBody>
-          <a:bodyPr rtlCol="0" anchor="ctr"/>
-          <a:lstStyle/>
-          <a:p>
-            <a:pPr algn="ctr"/>
-            <a:endParaRPr lang="en-US"/>
-          </a:p>
-        </p:txBody>
-      </p:sp>
-      <p:sp>
-        <p:nvSpPr>
-          <p:cNvPr id="76" name="Rectangle: Rounded Corners 75">
-            <a:extLst>
-              <a:ext uri="{FF2B5EF4-FFF2-40B4-BE49-F238E27FC236}">
-                <a16:creationId xmlns:a16="http://schemas.microsoft.com/office/drawing/2014/main" id="{171E17C3-B4FC-4C61-96E6-6F131783C199}"/>
-              </a:ext>
-            </a:extLst>
-          </p:cNvPr>
-          <p:cNvSpPr/>
-          <p:nvPr/>
-        </p:nvSpPr>
-        <p:spPr>
-          <a:xfrm>
-            <a:off x="3297416" y="71791"/>
-            <a:ext cx="8748573" cy="274320"/>
-          </a:xfrm>
-          <a:prstGeom prst="roundRect">
-            <a:avLst/>
-          </a:prstGeom>
-          <a:solidFill>
-            <a:schemeClr val="tx1"/>
-          </a:solidFill>
-          <a:ln>
-            <a:solidFill>
-              <a:schemeClr val="tx1">
-                <a:lumMod val="65000"/>
-                <a:lumOff val="35000"/>
-              </a:schemeClr>
-            </a:solidFill>
-          </a:ln>
-        </p:spPr>
-        <p:style>
-          <a:lnRef idx="2">
-            <a:schemeClr val="accent1">
-              <a:shade val="50000"/>
-            </a:schemeClr>
-          </a:lnRef>
-          <a:fillRef idx="1">
-            <a:schemeClr val="accent1"/>
-          </a:fillRef>
-          <a:effectRef idx="0">
-            <a:schemeClr val="accent1"/>
-          </a:effectRef>
-          <a:fontRef idx="minor">
-            <a:schemeClr val="lt1"/>
-          </a:fontRef>
-        </p:style>
-        <p:txBody>
-          <a:bodyPr rtlCol="0" anchor="ctr"/>
-          <a:lstStyle/>
-          <a:p>
-            <a:pPr algn="ctr"/>
-            <a:r>
-              <a:rPr lang="en-US" b="1" dirty="0"/>
-              <a:t>Details</a:t>
-            </a:r>
-          </a:p>
-        </p:txBody>
-      </p:sp>
-      <p:sp>
-        <p:nvSpPr>
-          <p:cNvPr id="26" name="Rectangle: Rounded Corners 25">
-            <a:extLst>
-              <a:ext uri="{FF2B5EF4-FFF2-40B4-BE49-F238E27FC236}">
-                <a16:creationId xmlns:a16="http://schemas.microsoft.com/office/drawing/2014/main" id="{597A2B9E-B283-447B-93EE-29035DA7D63F}"/>
-              </a:ext>
-            </a:extLst>
-          </p:cNvPr>
-          <p:cNvSpPr/>
-          <p:nvPr/>
-        </p:nvSpPr>
-        <p:spPr>
-          <a:xfrm>
-            <a:off x="142289" y="986986"/>
-            <a:ext cx="3017520" cy="5774889"/>
-          </a:xfrm>
-          <a:prstGeom prst="roundRect">
-            <a:avLst>
-              <a:gd name="adj" fmla="val 4514"/>
-            </a:avLst>
-          </a:prstGeom>
-          <a:solidFill>
-            <a:schemeClr val="accent4">
-              <a:lumMod val="20000"/>
-              <a:lumOff val="80000"/>
-            </a:schemeClr>
-          </a:solidFill>
-          <a:ln>
-            <a:solidFill>
-              <a:schemeClr val="bg1">
-                <a:lumMod val="65000"/>
-              </a:schemeClr>
-            </a:solidFill>
-          </a:ln>
-        </p:spPr>
-        <p:style>
-          <a:lnRef idx="2">
-            <a:schemeClr val="accent1">
-              <a:shade val="50000"/>
-            </a:schemeClr>
-          </a:lnRef>
-          <a:fillRef idx="1">
-            <a:schemeClr val="accent1"/>
-          </a:fillRef>
-          <a:effectRef idx="0">
-            <a:schemeClr val="accent1"/>
-          </a:effectRef>
-          <a:fontRef idx="minor">
-            <a:schemeClr val="lt1"/>
-          </a:fontRef>
-        </p:style>
-        <p:txBody>
-          <a:bodyPr rtlCol="0" anchor="ctr"/>
-          <a:lstStyle/>
-          <a:p>
-            <a:pPr algn="ctr"/>
-            <a:endParaRPr lang="en-US"/>
-          </a:p>
-        </p:txBody>
-      </p:sp>
-      <p:sp>
-        <p:nvSpPr>
-          <p:cNvPr id="27" name="Rectangle: Rounded Corners 26">
-            <a:extLst>
-              <a:ext uri="{FF2B5EF4-FFF2-40B4-BE49-F238E27FC236}">
-                <a16:creationId xmlns:a16="http://schemas.microsoft.com/office/drawing/2014/main" id="{4458A47F-3896-4B32-ACEC-2FEACF314A0E}"/>
-              </a:ext>
-            </a:extLst>
-          </p:cNvPr>
-          <p:cNvSpPr/>
-          <p:nvPr/>
-        </p:nvSpPr>
-        <p:spPr>
-          <a:xfrm>
-            <a:off x="146009" y="859502"/>
-            <a:ext cx="3035785" cy="274320"/>
-          </a:xfrm>
-          <a:prstGeom prst="roundRect">
-            <a:avLst/>
-          </a:prstGeom>
-          <a:solidFill>
-            <a:schemeClr val="tx1"/>
-          </a:solidFill>
-          <a:ln>
-            <a:solidFill>
-              <a:schemeClr val="tx1">
-                <a:lumMod val="65000"/>
-                <a:lumOff val="35000"/>
-              </a:schemeClr>
-            </a:solidFill>
-          </a:ln>
-        </p:spPr>
-        <p:style>
-          <a:lnRef idx="2">
-            <a:schemeClr val="accent1">
-              <a:shade val="50000"/>
-            </a:schemeClr>
-          </a:lnRef>
-          <a:fillRef idx="1">
-            <a:schemeClr val="accent1"/>
-          </a:fillRef>
-          <a:effectRef idx="0">
-            <a:schemeClr val="accent1"/>
-          </a:effectRef>
-          <a:fontRef idx="minor">
-            <a:schemeClr val="lt1"/>
-          </a:fontRef>
-        </p:style>
-        <p:txBody>
-          <a:bodyPr rtlCol="0" anchor="ctr"/>
-          <a:lstStyle/>
-          <a:p>
-            <a:pPr algn="ctr"/>
-            <a:r>
-              <a:rPr lang="en-US" b="1" dirty="0"/>
-              <a:t>Inputs</a:t>
-            </a:r>
-          </a:p>
-        </p:txBody>
-      </p:sp>
-      <p:sp>
-        <p:nvSpPr>
-          <p:cNvPr id="4" name="Rectangle: Rounded Corners 3">
-            <a:extLst>
-              <a:ext uri="{FF2B5EF4-FFF2-40B4-BE49-F238E27FC236}">
-                <a16:creationId xmlns:a16="http://schemas.microsoft.com/office/drawing/2014/main" id="{9E820235-A469-4A56-9583-68711E80DAA8}"/>
-              </a:ext>
-            </a:extLst>
-          </p:cNvPr>
-          <p:cNvSpPr/>
-          <p:nvPr/>
-        </p:nvSpPr>
-        <p:spPr>
-          <a:xfrm>
-            <a:off x="2285999" y="2345124"/>
-            <a:ext cx="8198827" cy="1369625"/>
-          </a:xfrm>
-          <a:prstGeom prst="roundRect">
-            <a:avLst/>
-          </a:prstGeom>
-          <a:gradFill flip="none" rotWithShape="1">
-            <a:gsLst>
-              <a:gs pos="25000">
-                <a:schemeClr val="accent1">
-                  <a:lumMod val="67000"/>
-                </a:schemeClr>
-              </a:gs>
-              <a:gs pos="63000">
-                <a:schemeClr val="accent1">
-                  <a:lumMod val="97000"/>
-                  <a:lumOff val="3000"/>
-                </a:schemeClr>
-              </a:gs>
-              <a:gs pos="94000">
-                <a:schemeClr val="accent1">
-                  <a:lumMod val="60000"/>
-                  <a:lumOff val="40000"/>
-                </a:schemeClr>
-              </a:gs>
-            </a:gsLst>
-            <a:lin ang="16200000" scaled="1"/>
-            <a:tileRect/>
-          </a:gradFill>
-          <a:effectLst>
-            <a:outerShdw blurRad="50800" dist="38100" dir="2700000" algn="tl" rotWithShape="0">
-              <a:prstClr val="black">
-                <a:alpha val="40000"/>
-              </a:prstClr>
-            </a:outerShdw>
-          </a:effectLst>
-        </p:spPr>
-        <p:style>
-          <a:lnRef idx="2">
-            <a:schemeClr val="accent1">
-              <a:shade val="50000"/>
-            </a:schemeClr>
-          </a:lnRef>
-          <a:fillRef idx="1">
-            <a:schemeClr val="accent1"/>
-          </a:fillRef>
-          <a:effectRef idx="0">
-            <a:schemeClr val="accent1"/>
-          </a:effectRef>
-          <a:fontRef idx="minor">
-            <a:schemeClr val="lt1"/>
-          </a:fontRef>
-        </p:style>
-        <p:txBody>
-          <a:bodyPr rtlCol="0" anchor="ctr"/>
-          <a:lstStyle/>
-          <a:p>
-            <a:pPr algn="ctr"/>
-            <a:r>
-              <a:rPr lang="en-US" sz="4800" dirty="0"/>
-              <a:t>Coming soon …</a:t>
-            </a:r>
-          </a:p>
-        </p:txBody>
-      </p:sp>
-      <p:sp>
-        <p:nvSpPr>
-          <p:cNvPr id="9" name="TextBox 8">
-            <a:extLst>
-              <a:ext uri="{FF2B5EF4-FFF2-40B4-BE49-F238E27FC236}">
-                <a16:creationId xmlns:a16="http://schemas.microsoft.com/office/drawing/2014/main" id="{E624FA1B-41A0-4B6A-9C3F-4821F66E2A63}"/>
-              </a:ext>
-            </a:extLst>
-          </p:cNvPr>
-          <p:cNvSpPr txBox="1"/>
-          <p:nvPr/>
-        </p:nvSpPr>
-        <p:spPr>
-          <a:xfrm>
-            <a:off x="351995" y="9124"/>
-            <a:ext cx="2520755" cy="461665"/>
-          </a:xfrm>
-          <a:prstGeom prst="rect">
-            <a:avLst/>
-          </a:prstGeom>
-          <a:noFill/>
-        </p:spPr>
-        <p:txBody>
-          <a:bodyPr wrap="square" rtlCol="0">
-            <a:spAutoFit/>
-          </a:bodyPr>
-          <a:lstStyle/>
-          <a:p>
-            <a:pPr algn="ctr"/>
-            <a:r>
-              <a:rPr lang="en-US" sz="2400" b="1" dirty="0" err="1"/>
-              <a:t>rmap</a:t>
-            </a:r>
-            <a:r>
-              <a:rPr lang="en-US" sz="2400" b="1" dirty="0"/>
-              <a:t> </a:t>
-            </a:r>
-            <a:r>
-              <a:rPr lang="en-US" sz="2000" dirty="0"/>
-              <a:t>Cheat Sheet</a:t>
-            </a:r>
-          </a:p>
-        </p:txBody>
-      </p:sp>
-      <p:sp>
-        <p:nvSpPr>
-          <p:cNvPr id="10" name="TextBox 9">
-            <a:extLst>
-              <a:ext uri="{FF2B5EF4-FFF2-40B4-BE49-F238E27FC236}">
-                <a16:creationId xmlns:a16="http://schemas.microsoft.com/office/drawing/2014/main" id="{008A730F-9F13-4A11-AEAE-F67277C7EE8B}"/>
-              </a:ext>
-            </a:extLst>
-          </p:cNvPr>
-          <p:cNvSpPr txBox="1"/>
-          <p:nvPr/>
-        </p:nvSpPr>
-        <p:spPr>
-          <a:xfrm>
-            <a:off x="341959" y="467335"/>
-            <a:ext cx="2532265" cy="246221"/>
-          </a:xfrm>
-          <a:prstGeom prst="rect">
-            <a:avLst/>
-          </a:prstGeom>
-          <a:noFill/>
-        </p:spPr>
-        <p:txBody>
-          <a:bodyPr wrap="square" rtlCol="0">
-            <a:spAutoFit/>
-          </a:bodyPr>
-          <a:lstStyle/>
-          <a:p>
-            <a:pPr algn="ctr"/>
-            <a:r>
-              <a:rPr lang="en-US" sz="1000" dirty="0">
-                <a:hlinkClick r:id="rId3"/>
-              </a:rPr>
-              <a:t>https://github.com/JGCRI/rmap</a:t>
-            </a:r>
-            <a:endParaRPr lang="en-US" sz="1000" dirty="0"/>
-          </a:p>
-        </p:txBody>
-      </p:sp>
-    </p:spTree>
-    <p:extLst>
-      <p:ext uri="{BB962C8B-B14F-4D97-AF65-F5344CB8AC3E}">
-        <p14:creationId xmlns:p14="http://schemas.microsoft.com/office/powerpoint/2010/main" val="963788966"/>
       </p:ext>
     </p:extLst>
   </p:cSld>

</xml_diff>

<commit_message>
Updating rmaps with options for combinedOnly and diffOnly
</commit_message>
<xml_diff>
--- a/inst/extras/cheatsheet.pptx
+++ b/inst/extras/cheatsheet.pptx
@@ -197,7 +197,7 @@
           <a:p>
             <a:fld id="{D0A1FD91-65A3-4356-9704-301FA4DE96A7}" type="datetimeFigureOut">
               <a:rPr lang="en-US" smtClean="0"/>
-              <a:t>7/13/2021</a:t>
+              <a:t>7/27/2021</a:t>
             </a:fld>
             <a:endParaRPr lang="en-US"/>
           </a:p>
@@ -695,7 +695,7 @@
           <a:p>
             <a:fld id="{89D4607A-7F2D-4A84-AFA7-3FE67E9D53B7}" type="datetimeFigureOut">
               <a:rPr lang="en-US" smtClean="0"/>
-              <a:t>7/13/2021</a:t>
+              <a:t>7/27/2021</a:t>
             </a:fld>
             <a:endParaRPr lang="en-US"/>
           </a:p>
@@ -893,7 +893,7 @@
           <a:p>
             <a:fld id="{89D4607A-7F2D-4A84-AFA7-3FE67E9D53B7}" type="datetimeFigureOut">
               <a:rPr lang="en-US" smtClean="0"/>
-              <a:t>7/13/2021</a:t>
+              <a:t>7/27/2021</a:t>
             </a:fld>
             <a:endParaRPr lang="en-US"/>
           </a:p>
@@ -1101,7 +1101,7 @@
           <a:p>
             <a:fld id="{89D4607A-7F2D-4A84-AFA7-3FE67E9D53B7}" type="datetimeFigureOut">
               <a:rPr lang="en-US" smtClean="0"/>
-              <a:t>7/13/2021</a:t>
+              <a:t>7/27/2021</a:t>
             </a:fld>
             <a:endParaRPr lang="en-US"/>
           </a:p>
@@ -1299,7 +1299,7 @@
           <a:p>
             <a:fld id="{89D4607A-7F2D-4A84-AFA7-3FE67E9D53B7}" type="datetimeFigureOut">
               <a:rPr lang="en-US" smtClean="0"/>
-              <a:t>7/13/2021</a:t>
+              <a:t>7/27/2021</a:t>
             </a:fld>
             <a:endParaRPr lang="en-US"/>
           </a:p>
@@ -1574,7 +1574,7 @@
           <a:p>
             <a:fld id="{89D4607A-7F2D-4A84-AFA7-3FE67E9D53B7}" type="datetimeFigureOut">
               <a:rPr lang="en-US" smtClean="0"/>
-              <a:t>7/13/2021</a:t>
+              <a:t>7/27/2021</a:t>
             </a:fld>
             <a:endParaRPr lang="en-US"/>
           </a:p>
@@ -1839,7 +1839,7 @@
           <a:p>
             <a:fld id="{89D4607A-7F2D-4A84-AFA7-3FE67E9D53B7}" type="datetimeFigureOut">
               <a:rPr lang="en-US" smtClean="0"/>
-              <a:t>7/13/2021</a:t>
+              <a:t>7/27/2021</a:t>
             </a:fld>
             <a:endParaRPr lang="en-US"/>
           </a:p>
@@ -2251,7 +2251,7 @@
           <a:p>
             <a:fld id="{89D4607A-7F2D-4A84-AFA7-3FE67E9D53B7}" type="datetimeFigureOut">
               <a:rPr lang="en-US" smtClean="0"/>
-              <a:t>7/13/2021</a:t>
+              <a:t>7/27/2021</a:t>
             </a:fld>
             <a:endParaRPr lang="en-US"/>
           </a:p>
@@ -2392,7 +2392,7 @@
           <a:p>
             <a:fld id="{89D4607A-7F2D-4A84-AFA7-3FE67E9D53B7}" type="datetimeFigureOut">
               <a:rPr lang="en-US" smtClean="0"/>
-              <a:t>7/13/2021</a:t>
+              <a:t>7/27/2021</a:t>
             </a:fld>
             <a:endParaRPr lang="en-US"/>
           </a:p>
@@ -2505,7 +2505,7 @@
           <a:p>
             <a:fld id="{89D4607A-7F2D-4A84-AFA7-3FE67E9D53B7}" type="datetimeFigureOut">
               <a:rPr lang="en-US" smtClean="0"/>
-              <a:t>7/13/2021</a:t>
+              <a:t>7/27/2021</a:t>
             </a:fld>
             <a:endParaRPr lang="en-US"/>
           </a:p>
@@ -2816,7 +2816,7 @@
           <a:p>
             <a:fld id="{89D4607A-7F2D-4A84-AFA7-3FE67E9D53B7}" type="datetimeFigureOut">
               <a:rPr lang="en-US" smtClean="0"/>
-              <a:t>7/13/2021</a:t>
+              <a:t>7/27/2021</a:t>
             </a:fld>
             <a:endParaRPr lang="en-US"/>
           </a:p>
@@ -3104,7 +3104,7 @@
           <a:p>
             <a:fld id="{89D4607A-7F2D-4A84-AFA7-3FE67E9D53B7}" type="datetimeFigureOut">
               <a:rPr lang="en-US" smtClean="0"/>
-              <a:t>7/13/2021</a:t>
+              <a:t>7/27/2021</a:t>
             </a:fld>
             <a:endParaRPr lang="en-US"/>
           </a:p>
@@ -3345,7 +3345,7 @@
           <a:p>
             <a:fld id="{89D4607A-7F2D-4A84-AFA7-3FE67E9D53B7}" type="datetimeFigureOut">
               <a:rPr lang="en-US" smtClean="0"/>
-              <a:t>7/13/2021</a:t>
+              <a:t>7/27/2021</a:t>
             </a:fld>
             <a:endParaRPr lang="en-US"/>
           </a:p>
@@ -4158,8 +4158,8 @@
         </p:nvSpPr>
         <p:spPr>
           <a:xfrm>
-            <a:off x="203646" y="5187413"/>
-            <a:ext cx="2799549" cy="890034"/>
+            <a:off x="195913" y="4468636"/>
+            <a:ext cx="2799549" cy="523752"/>
           </a:xfrm>
           <a:prstGeom prst="roundRect">
             <a:avLst/>
@@ -4271,68 +4271,7 @@
                   <a:schemeClr val="tx1"/>
                 </a:solidFill>
               </a:rPr>
-              <a:t>");  </a:t>
-            </a:r>
-          </a:p>
-          <a:p>
-            <a:endParaRPr lang="en-US" altLang="en-US" sz="800" dirty="0">
-              <a:solidFill>
-                <a:schemeClr val="tx1"/>
-              </a:solidFill>
-            </a:endParaRPr>
-          </a:p>
-          <a:p>
-            <a:r>
-              <a:rPr lang="en-US" altLang="en-US" sz="800" dirty="0">
-                <a:solidFill>
-                  <a:schemeClr val="tx1"/>
-                </a:solidFill>
-              </a:rPr>
-              <a:t>library(</a:t>
-            </a:r>
-            <a:r>
-              <a:rPr lang="en-US" altLang="en-US" sz="800" dirty="0" err="1">
-                <a:solidFill>
-                  <a:schemeClr val="tx1"/>
-                </a:solidFill>
-              </a:rPr>
-              <a:t>rmap</a:t>
-            </a:r>
-            <a:r>
-              <a:rPr lang="en-US" altLang="en-US" sz="800" dirty="0">
-                <a:solidFill>
-                  <a:schemeClr val="tx1"/>
-                </a:solidFill>
-              </a:rPr>
-              <a:t>); </a:t>
-            </a:r>
-          </a:p>
-          <a:p>
-            <a:r>
-              <a:rPr lang="en-US" altLang="en-US" sz="800" dirty="0">
-                <a:solidFill>
-                  <a:schemeClr val="tx1"/>
-                </a:solidFill>
-              </a:rPr>
-              <a:t>map (data)   # </a:t>
-            </a:r>
-            <a:r>
-              <a:rPr lang="en-US" altLang="en-US" sz="800" b="1" dirty="0">
-                <a:solidFill>
-                  <a:schemeClr val="tx1"/>
-                </a:solidFill>
-              </a:rPr>
-              <a:t>OR</a:t>
-            </a:r>
-          </a:p>
-          <a:p>
-            <a:r>
-              <a:rPr lang="en-US" altLang="en-US" sz="800" dirty="0">
-                <a:solidFill>
-                  <a:schemeClr val="tx1"/>
-                </a:solidFill>
-              </a:rPr>
-              <a:t>map("path/To/myFile.csv")</a:t>
+              <a:t>"); </a:t>
             </a:r>
           </a:p>
         </p:txBody>
@@ -4551,10 +4490,10 @@
           </a:lstStyle>
           <a:p>
             <a:r>
-              <a:rPr lang="en-US" altLang="en-US" b="1">
+              <a:rPr lang="en-US" altLang="en-US" b="1" dirty="0">
                 <a:latin typeface="+mn-lt"/>
               </a:rPr>
-              <a:t>               myFile.csv file            OR                   R Data Frame</a:t>
+              <a:t>      my_polygon_file.csv       OR                   R Data Frame</a:t>
             </a:r>
           </a:p>
         </p:txBody>
@@ -4618,12 +4557,28 @@
               </a:lnSpc>
             </a:pPr>
             <a:r>
-              <a:rPr lang="en-US" altLang="en-US" sz="800">
-                <a:solidFill>
-                  <a:schemeClr val="tx1"/>
-                </a:solidFill>
-              </a:rPr>
-              <a:t>data = data.frame(</a:t>
+              <a:rPr lang="en-US" altLang="en-US" sz="800" dirty="0">
+                <a:solidFill>
+                  <a:schemeClr val="tx1"/>
+                </a:solidFill>
+              </a:rPr>
+              <a:t>data = </a:t>
+            </a:r>
+            <a:r>
+              <a:rPr lang="en-US" altLang="en-US" sz="800" dirty="0" err="1">
+                <a:solidFill>
+                  <a:schemeClr val="tx1"/>
+                </a:solidFill>
+              </a:rPr>
+              <a:t>data.frame</a:t>
+            </a:r>
+            <a:r>
+              <a:rPr lang="en-US" altLang="en-US" sz="800" dirty="0">
+                <a:solidFill>
+                  <a:schemeClr val="tx1"/>
+                </a:solidFill>
+              </a:rPr>
+              <a:t>(</a:t>
             </a:r>
           </a:p>
           <a:p>
@@ -4633,12 +4588,28 @@
               </a:lnSpc>
             </a:pPr>
             <a:r>
-              <a:rPr lang="en-US" altLang="en-US" sz="800">
-                <a:solidFill>
-                  <a:schemeClr val="tx1"/>
-                </a:solidFill>
-              </a:rPr>
-              <a:t>          subRegion = c("TX","AZ"),</a:t>
+              <a:rPr lang="en-US" altLang="en-US" sz="800" dirty="0">
+                <a:solidFill>
+                  <a:schemeClr val="tx1"/>
+                </a:solidFill>
+              </a:rPr>
+              <a:t>          </a:t>
+            </a:r>
+            <a:r>
+              <a:rPr lang="en-US" altLang="en-US" sz="800" dirty="0" err="1">
+                <a:solidFill>
+                  <a:schemeClr val="tx1"/>
+                </a:solidFill>
+              </a:rPr>
+              <a:t>subRegion</a:t>
+            </a:r>
+            <a:r>
+              <a:rPr lang="en-US" altLang="en-US" sz="800" dirty="0">
+                <a:solidFill>
+                  <a:schemeClr val="tx1"/>
+                </a:solidFill>
+              </a:rPr>
+              <a:t> = c("TX","AZ"),</a:t>
             </a:r>
           </a:p>
           <a:p>
@@ -4648,7 +4619,7 @@
               </a:lnSpc>
             </a:pPr>
             <a:r>
-              <a:rPr lang="en-US" altLang="en-US" sz="800">
+              <a:rPr lang="en-US" altLang="en-US" sz="800" dirty="0">
                 <a:solidFill>
                   <a:schemeClr val="tx1"/>
                 </a:solidFill>
@@ -4662,7 +4633,7 @@
                 <a:spcPct val="150000"/>
               </a:lnSpc>
             </a:pPr>
-            <a:endParaRPr lang="en-US" altLang="en-US" sz="800">
+            <a:endParaRPr lang="en-US" altLang="en-US" sz="800" dirty="0">
               <a:solidFill>
                 <a:schemeClr val="tx1"/>
               </a:solidFill>
@@ -4685,7 +4656,7 @@
         <p:spPr>
           <a:xfrm>
             <a:off x="206139" y="1221692"/>
-            <a:ext cx="742511" cy="230832"/>
+            <a:ext cx="1249060" cy="230832"/>
           </a:xfrm>
           <a:prstGeom prst="rect">
             <a:avLst/>
@@ -4703,8 +4674,8 @@
           <a:lstStyle/>
           <a:p>
             <a:r>
-              <a:rPr lang="en-US" sz="900" b="1"/>
-              <a:t>KEY INPUTS</a:t>
+              <a:rPr lang="en-US" sz="900" b="1" dirty="0"/>
+              <a:t>KEY INPUTS FORMATS</a:t>
             </a:r>
           </a:p>
         </p:txBody>
@@ -4723,8 +4694,8 @@
         </p:nvSpPr>
         <p:spPr>
           <a:xfrm>
-            <a:off x="229169" y="4892839"/>
-            <a:ext cx="832279" cy="230832"/>
+            <a:off x="203645" y="4162734"/>
+            <a:ext cx="881973" cy="230832"/>
           </a:xfrm>
           <a:prstGeom prst="rect">
             <a:avLst/>
@@ -4743,7 +4714,7 @@
           <a:p>
             <a:r>
               <a:rPr lang="en-US" sz="900" b="1" dirty="0"/>
-              <a:t>Simple Shape</a:t>
+              <a:t>INSTALLATION</a:t>
             </a:r>
           </a:p>
         </p:txBody>
@@ -5460,7 +5431,7 @@
         </p:nvSpPr>
         <p:spPr>
           <a:xfrm>
-            <a:off x="133168" y="2437957"/>
+            <a:off x="125829" y="3789029"/>
             <a:ext cx="2949846" cy="246221"/>
           </a:xfrm>
           <a:prstGeom prst="rect">
@@ -6009,8 +5980,8 @@
           <a:p>
             <a:pPr algn="ctr"/>
             <a:r>
-              <a:rPr lang="en-US" b="1"/>
-              <a:t>Customize Scales, Colors, Background</a:t>
+              <a:rPr lang="en-US" b="1" dirty="0"/>
+              <a:t>Customize Scales, Legend Type, Colors, Background</a:t>
             </a:r>
           </a:p>
         </p:txBody>
@@ -6030,7 +6001,7 @@
         <p:spPr>
           <a:xfrm>
             <a:off x="3366174" y="4933265"/>
-            <a:ext cx="2620241" cy="972350"/>
+            <a:ext cx="2844505" cy="972350"/>
           </a:xfrm>
           <a:prstGeom prst="roundRect">
             <a:avLst/>
@@ -6172,7 +6143,23 @@
                   <a:schemeClr val="tx1"/>
                 </a:solidFill>
               </a:rPr>
-              <a:t> =  mapUS49, crop=F ,</a:t>
+              <a:t> =  mapUS49, crop=F , </a:t>
+            </a:r>
+            <a:r>
+              <a:rPr lang="en-US" altLang="en-US" sz="800" dirty="0" err="1">
+                <a:solidFill>
+                  <a:schemeClr val="tx1"/>
+                </a:solidFill>
+              </a:rPr>
+              <a:t>scenRef</a:t>
+            </a:r>
+            <a:r>
+              <a:rPr lang="en-US" altLang="en-US" sz="800" dirty="0">
+                <a:solidFill>
+                  <a:schemeClr val="tx1"/>
+                </a:solidFill>
+              </a:rPr>
+              <a:t>="scen1",</a:t>
             </a:r>
           </a:p>
           <a:p>
@@ -6238,7 +6225,7 @@
         </p:nvSpPr>
         <p:spPr>
           <a:xfrm>
-            <a:off x="3999666" y="4663647"/>
+            <a:off x="4309643" y="4659880"/>
             <a:ext cx="947695" cy="230832"/>
           </a:xfrm>
           <a:prstGeom prst="rect">
@@ -6257,7 +6244,7 @@
           <a:lstStyle/>
           <a:p>
             <a:r>
-              <a:rPr lang="en-US" sz="900" b="1"/>
+              <a:rPr lang="en-US" sz="900" b="1" dirty="0"/>
               <a:t>Set scale ranges</a:t>
             </a:r>
           </a:p>
@@ -6277,8 +6264,8 @@
         </p:nvSpPr>
         <p:spPr>
           <a:xfrm>
-            <a:off x="7308483" y="4663647"/>
-            <a:ext cx="955711" cy="230832"/>
+            <a:off x="7198768" y="4659880"/>
+            <a:ext cx="1689886" cy="230832"/>
           </a:xfrm>
           <a:prstGeom prst="rect">
             <a:avLst/>
@@ -6296,8 +6283,8 @@
           <a:lstStyle/>
           <a:p>
             <a:r>
-              <a:rPr lang="en-US" sz="900" b="1"/>
-              <a:t>Change Palettes</a:t>
+              <a:rPr lang="en-US" sz="900" b="1" dirty="0"/>
+              <a:t>Change Palettes &amp; Legend Type</a:t>
             </a:r>
           </a:p>
         </p:txBody>
@@ -6316,7 +6303,7 @@
         </p:nvSpPr>
         <p:spPr>
           <a:xfrm>
-            <a:off x="10310765" y="4666858"/>
+            <a:off x="10519649" y="4659880"/>
             <a:ext cx="756938" cy="230832"/>
           </a:xfrm>
           <a:prstGeom prst="rect">
@@ -6355,8 +6342,8 @@
         </p:nvSpPr>
         <p:spPr>
           <a:xfrm>
-            <a:off x="6267762" y="4933265"/>
-            <a:ext cx="3037154" cy="972350"/>
+            <a:off x="6394232" y="4933265"/>
+            <a:ext cx="3185654" cy="972350"/>
           </a:xfrm>
           <a:prstGeom prst="roundRect">
             <a:avLst/>
@@ -6540,12 +6527,20 @@
               </a:lnSpc>
             </a:pPr>
             <a:r>
+              <a:rPr lang="fr-FR" altLang="en-US" sz="800" dirty="0">
+                <a:solidFill>
+                  <a:srgbClr val="C00000"/>
+                </a:solidFill>
+              </a:rPr>
+              <a:t>palette = "</a:t>
+            </a:r>
+            <a:r>
               <a:rPr lang="fr-FR" altLang="en-US" sz="800" dirty="0" err="1">
                 <a:solidFill>
                   <a:srgbClr val="C00000"/>
                 </a:solidFill>
               </a:rPr>
-              <a:t>classPalette</a:t>
+              <a:t>pal_wet</a:t>
             </a:r>
             <a:r>
               <a:rPr lang="fr-FR" altLang="en-US" sz="800" dirty="0">
@@ -6553,6 +6548,22 @@
                   <a:srgbClr val="C00000"/>
                 </a:solidFill>
               </a:rPr>
+              <a:t>", </a:t>
+            </a:r>
+            <a:r>
+              <a:rPr lang="fr-FR" altLang="en-US" sz="800" dirty="0" err="1">
+                <a:solidFill>
+                  <a:srgbClr val="C00000"/>
+                </a:solidFill>
+              </a:rPr>
+              <a:t>paletteDiff</a:t>
+            </a:r>
+            <a:r>
+              <a:rPr lang="fr-FR" altLang="en-US" sz="800" dirty="0">
+                <a:solidFill>
+                  <a:srgbClr val="C00000"/>
+                </a:solidFill>
+              </a:rPr>
               <a:t> = "</a:t>
             </a:r>
             <a:r>
@@ -6561,7 +6572,7 @@
                   <a:srgbClr val="C00000"/>
                 </a:solidFill>
               </a:rPr>
-              <a:t>pal_wet</a:t>
+              <a:t>pal_green</a:t>
             </a:r>
             <a:r>
               <a:rPr lang="fr-FR" altLang="en-US" sz="800" dirty="0">
@@ -6569,7 +6580,7 @@
                   <a:srgbClr val="C00000"/>
                 </a:solidFill>
               </a:rPr>
-              <a:t>", </a:t>
+              <a:t> "  , </a:t>
             </a:r>
             <a:r>
               <a:rPr lang="fr-FR" altLang="en-US" sz="800" dirty="0" err="1">
@@ -6577,7 +6588,7 @@
                   <a:srgbClr val="C00000"/>
                 </a:solidFill>
               </a:rPr>
-              <a:t>classPaletteDiff</a:t>
+              <a:t>legendType</a:t>
             </a:r>
             <a:r>
               <a:rPr lang="fr-FR" altLang="en-US" sz="800" dirty="0">
@@ -6585,7 +6596,15 @@
                   <a:srgbClr val="C00000"/>
                 </a:solidFill>
               </a:rPr>
-              <a:t> = "</a:t>
+              <a:t>=</a:t>
+            </a:r>
+            <a:r>
+              <a:rPr lang="en-US" altLang="en-US" sz="800" dirty="0">
+                <a:solidFill>
+                  <a:srgbClr val="C00000"/>
+                </a:solidFill>
+              </a:rPr>
+              <a:t>"</a:t>
             </a:r>
             <a:r>
               <a:rPr lang="fr-FR" altLang="en-US" sz="800" dirty="0" err="1">
@@ -6593,23 +6612,15 @@
                   <a:srgbClr val="C00000"/>
                 </a:solidFill>
               </a:rPr>
-              <a:t>pal_green</a:t>
-            </a:r>
-            <a:r>
-              <a:rPr lang="fr-FR" altLang="en-US" sz="800" dirty="0">
+              <a:t>pretty</a:t>
+            </a:r>
+            <a:r>
+              <a:rPr lang="en-US" altLang="en-US" sz="800" dirty="0">
                 <a:solidFill>
                   <a:srgbClr val="C00000"/>
                 </a:solidFill>
               </a:rPr>
-              <a:t>"</a:t>
-            </a:r>
-            <a:r>
-              <a:rPr lang="en-US" altLang="en-US" sz="800" dirty="0">
-                <a:solidFill>
-                  <a:schemeClr val="tx1"/>
-                </a:solidFill>
-              </a:rPr>
-              <a:t>)</a:t>
+              <a:t>")</a:t>
             </a:r>
           </a:p>
         </p:txBody>
@@ -6764,7 +6775,23 @@
                   <a:schemeClr val="tx1"/>
                 </a:solidFill>
               </a:rPr>
-              <a:t> =  mapUS49, crop=F,</a:t>
+              <a:t> =  </a:t>
+            </a:r>
+            <a:r>
+              <a:rPr lang="en-US" altLang="en-US" sz="800" dirty="0" err="1">
+                <a:solidFill>
+                  <a:schemeClr val="tx1"/>
+                </a:solidFill>
+              </a:rPr>
+              <a:t>mapCountries</a:t>
+            </a:r>
+            <a:r>
+              <a:rPr lang="en-US" altLang="en-US" sz="800" dirty="0">
+                <a:solidFill>
+                  <a:schemeClr val="tx1"/>
+                </a:solidFill>
+              </a:rPr>
+              <a:t>, crop=F,</a:t>
             </a:r>
           </a:p>
           <a:p>
@@ -6792,265 +6819,6 @@
           </a:p>
         </p:txBody>
       </p:sp>
-      <p:pic>
-        <p:nvPicPr>
-          <p:cNvPr id="21" name="Picture 20">
-            <a:extLst>
-              <a:ext uri="{FF2B5EF4-FFF2-40B4-BE49-F238E27FC236}">
-                <a16:creationId xmlns:a16="http://schemas.microsoft.com/office/drawing/2014/main" id="{2E7C1C53-A6FA-4BEA-8A9A-D09A8339EEA5}"/>
-              </a:ext>
-            </a:extLst>
-          </p:cNvPr>
-          <p:cNvPicPr>
-            <a:picLocks noChangeAspect="1"/>
-          </p:cNvPicPr>
-          <p:nvPr/>
-        </p:nvPicPr>
-        <p:blipFill>
-          <a:blip r:embed="rId3"/>
-          <a:stretch>
-            <a:fillRect/>
-          </a:stretch>
-        </p:blipFill>
-        <p:spPr>
-          <a:xfrm>
-            <a:off x="3610343" y="5977982"/>
-            <a:ext cx="1242621" cy="670289"/>
-          </a:xfrm>
-          <a:prstGeom prst="rect">
-            <a:avLst/>
-          </a:prstGeom>
-          <a:ln>
-            <a:solidFill>
-              <a:schemeClr val="bg1">
-                <a:lumMod val="65000"/>
-              </a:schemeClr>
-            </a:solidFill>
-          </a:ln>
-        </p:spPr>
-      </p:pic>
-      <p:pic>
-        <p:nvPicPr>
-          <p:cNvPr id="22" name="Picture 21">
-            <a:extLst>
-              <a:ext uri="{FF2B5EF4-FFF2-40B4-BE49-F238E27FC236}">
-                <a16:creationId xmlns:a16="http://schemas.microsoft.com/office/drawing/2014/main" id="{D94AAD17-3CC5-4AE2-B439-8299998C6739}"/>
-              </a:ext>
-            </a:extLst>
-          </p:cNvPr>
-          <p:cNvPicPr>
-            <a:picLocks noChangeAspect="1"/>
-          </p:cNvPicPr>
-          <p:nvPr/>
-        </p:nvPicPr>
-        <p:blipFill>
-          <a:blip r:embed="rId4"/>
-          <a:stretch>
-            <a:fillRect/>
-          </a:stretch>
-        </p:blipFill>
-        <p:spPr>
-          <a:xfrm>
-            <a:off x="4919011" y="5976342"/>
-            <a:ext cx="579508" cy="679633"/>
-          </a:xfrm>
-          <a:prstGeom prst="rect">
-            <a:avLst/>
-          </a:prstGeom>
-          <a:ln>
-            <a:solidFill>
-              <a:schemeClr val="bg1">
-                <a:lumMod val="65000"/>
-              </a:schemeClr>
-            </a:solidFill>
-          </a:ln>
-        </p:spPr>
-      </p:pic>
-      <p:pic>
-        <p:nvPicPr>
-          <p:cNvPr id="23" name="Picture 22">
-            <a:extLst>
-              <a:ext uri="{FF2B5EF4-FFF2-40B4-BE49-F238E27FC236}">
-                <a16:creationId xmlns:a16="http://schemas.microsoft.com/office/drawing/2014/main" id="{A5976D05-94F9-4F60-93C3-424EC7626494}"/>
-              </a:ext>
-            </a:extLst>
-          </p:cNvPr>
-          <p:cNvPicPr>
-            <a:picLocks noChangeAspect="1"/>
-          </p:cNvPicPr>
-          <p:nvPr/>
-        </p:nvPicPr>
-        <p:blipFill>
-          <a:blip r:embed="rId5"/>
-          <a:stretch>
-            <a:fillRect/>
-          </a:stretch>
-        </p:blipFill>
-        <p:spPr>
-          <a:xfrm>
-            <a:off x="5940611" y="5985686"/>
-            <a:ext cx="1251144" cy="670289"/>
-          </a:xfrm>
-          <a:prstGeom prst="rect">
-            <a:avLst/>
-          </a:prstGeom>
-          <a:ln>
-            <a:solidFill>
-              <a:schemeClr val="bg1">
-                <a:lumMod val="65000"/>
-              </a:schemeClr>
-            </a:solidFill>
-          </a:ln>
-        </p:spPr>
-      </p:pic>
-      <p:pic>
-        <p:nvPicPr>
-          <p:cNvPr id="24" name="Picture 23">
-            <a:extLst>
-              <a:ext uri="{FF2B5EF4-FFF2-40B4-BE49-F238E27FC236}">
-                <a16:creationId xmlns:a16="http://schemas.microsoft.com/office/drawing/2014/main" id="{7DB80314-C6D9-43C5-A4C9-68AE0AFC836D}"/>
-              </a:ext>
-            </a:extLst>
-          </p:cNvPr>
-          <p:cNvPicPr>
-            <a:picLocks noChangeAspect="1"/>
-          </p:cNvPicPr>
-          <p:nvPr/>
-        </p:nvPicPr>
-        <p:blipFill>
-          <a:blip r:embed="rId6"/>
-          <a:stretch>
-            <a:fillRect/>
-          </a:stretch>
-        </p:blipFill>
-        <p:spPr>
-          <a:xfrm>
-            <a:off x="7231513" y="5984606"/>
-            <a:ext cx="518427" cy="670289"/>
-          </a:xfrm>
-          <a:prstGeom prst="rect">
-            <a:avLst/>
-          </a:prstGeom>
-          <a:ln>
-            <a:solidFill>
-              <a:schemeClr val="bg1">
-                <a:lumMod val="65000"/>
-              </a:schemeClr>
-            </a:solidFill>
-          </a:ln>
-        </p:spPr>
-      </p:pic>
-      <p:pic>
-        <p:nvPicPr>
-          <p:cNvPr id="30" name="Picture 29">
-            <a:extLst>
-              <a:ext uri="{FF2B5EF4-FFF2-40B4-BE49-F238E27FC236}">
-                <a16:creationId xmlns:a16="http://schemas.microsoft.com/office/drawing/2014/main" id="{F0554C39-3942-4F29-A810-E26C42C76A01}"/>
-              </a:ext>
-            </a:extLst>
-          </p:cNvPr>
-          <p:cNvPicPr>
-            <a:picLocks noChangeAspect="1"/>
-          </p:cNvPicPr>
-          <p:nvPr/>
-        </p:nvPicPr>
-        <p:blipFill>
-          <a:blip r:embed="rId7"/>
-          <a:stretch>
-            <a:fillRect/>
-          </a:stretch>
-        </p:blipFill>
-        <p:spPr>
-          <a:xfrm>
-            <a:off x="7789698" y="5969317"/>
-            <a:ext cx="1271866" cy="685578"/>
-          </a:xfrm>
-          <a:prstGeom prst="rect">
-            <a:avLst/>
-          </a:prstGeom>
-          <a:ln>
-            <a:solidFill>
-              <a:schemeClr val="bg1">
-                <a:lumMod val="65000"/>
-              </a:schemeClr>
-            </a:solidFill>
-          </a:ln>
-        </p:spPr>
-      </p:pic>
-      <p:pic>
-        <p:nvPicPr>
-          <p:cNvPr id="31" name="Picture 30">
-            <a:extLst>
-              <a:ext uri="{FF2B5EF4-FFF2-40B4-BE49-F238E27FC236}">
-                <a16:creationId xmlns:a16="http://schemas.microsoft.com/office/drawing/2014/main" id="{D29E05D8-BE8E-4831-8CD6-804C6391D369}"/>
-              </a:ext>
-            </a:extLst>
-          </p:cNvPr>
-          <p:cNvPicPr>
-            <a:picLocks noChangeAspect="1"/>
-          </p:cNvPicPr>
-          <p:nvPr/>
-        </p:nvPicPr>
-        <p:blipFill>
-          <a:blip r:embed="rId8"/>
-          <a:stretch>
-            <a:fillRect/>
-          </a:stretch>
-        </p:blipFill>
-        <p:spPr>
-          <a:xfrm>
-            <a:off x="9089711" y="5969317"/>
-            <a:ext cx="648260" cy="687379"/>
-          </a:xfrm>
-          <a:prstGeom prst="rect">
-            <a:avLst/>
-          </a:prstGeom>
-          <a:ln>
-            <a:solidFill>
-              <a:schemeClr val="bg1">
-                <a:lumMod val="65000"/>
-              </a:schemeClr>
-            </a:solidFill>
-          </a:ln>
-        </p:spPr>
-      </p:pic>
-      <p:pic>
-        <p:nvPicPr>
-          <p:cNvPr id="32" name="Picture 31">
-            <a:extLst>
-              <a:ext uri="{FF2B5EF4-FFF2-40B4-BE49-F238E27FC236}">
-                <a16:creationId xmlns:a16="http://schemas.microsoft.com/office/drawing/2014/main" id="{002DC5BC-946B-492B-B136-0920170FDA84}"/>
-              </a:ext>
-            </a:extLst>
-          </p:cNvPr>
-          <p:cNvPicPr>
-            <a:picLocks noChangeAspect="1"/>
-          </p:cNvPicPr>
-          <p:nvPr/>
-        </p:nvPicPr>
-        <p:blipFill>
-          <a:blip r:embed="rId9"/>
-          <a:stretch>
-            <a:fillRect/>
-          </a:stretch>
-        </p:blipFill>
-        <p:spPr>
-          <a:xfrm>
-            <a:off x="9955561" y="5950751"/>
-            <a:ext cx="1796716" cy="726712"/>
-          </a:xfrm>
-          <a:prstGeom prst="rect">
-            <a:avLst/>
-          </a:prstGeom>
-          <a:ln>
-            <a:solidFill>
-              <a:schemeClr val="bg1">
-                <a:lumMod val="65000"/>
-              </a:schemeClr>
-            </a:solidFill>
-          </a:ln>
-        </p:spPr>
-      </p:pic>
       <p:sp>
         <p:nvSpPr>
           <p:cNvPr id="58" name="TextBox 57">
@@ -7126,7 +6894,7 @@
             <a:pPr algn="ctr"/>
             <a:r>
               <a:rPr lang="en-US" sz="1400" dirty="0" err="1">
-                <a:hlinkClick r:id="rId10"/>
+                <a:hlinkClick r:id="rId3"/>
               </a:rPr>
               <a:t>Github</a:t>
             </a:r>
@@ -7136,7 +6904,7 @@
             </a:r>
             <a:r>
               <a:rPr lang="en-US" sz="1400" dirty="0">
-                <a:hlinkClick r:id="rId11"/>
+                <a:hlinkClick r:id="rId4"/>
               </a:rPr>
               <a:t>User Guide</a:t>
             </a:r>
@@ -7159,14 +6927,14 @@
           <p:nvPr>
             <p:extLst>
               <p:ext uri="{D42A27DB-BD31-4B8C-83A1-F6EECF244321}">
-                <p14:modId xmlns:p14="http://schemas.microsoft.com/office/powerpoint/2010/main" val="3111082713"/>
+                <p14:modId xmlns:p14="http://schemas.microsoft.com/office/powerpoint/2010/main" val="3041019263"/>
               </p:ext>
             </p:extLst>
           </p:nvPr>
         </p:nvGraphicFramePr>
         <p:xfrm>
-          <a:off x="229168" y="2766803"/>
-          <a:ext cx="1989246" cy="1066800"/>
+          <a:off x="203646" y="2629433"/>
+          <a:ext cx="1286052" cy="1095855"/>
         </p:xfrm>
         <a:graphic>
           <a:graphicData uri="http://schemas.openxmlformats.org/drawingml/2006/table">
@@ -7175,21 +6943,21 @@
                 <a:tableStyleId>{5940675A-B579-460E-94D1-54222C63F5DA}</a:tableStyleId>
               </a:tblPr>
               <a:tblGrid>
-                <a:gridCol w="663082">
+                <a:gridCol w="428684">
                   <a:extLst>
                     <a:ext uri="{9D8B030D-6E8A-4147-A177-3AD203B41FA5}">
                       <a16:colId xmlns:a16="http://schemas.microsoft.com/office/drawing/2014/main" val="749713345"/>
                     </a:ext>
                   </a:extLst>
                 </a:gridCol>
-                <a:gridCol w="663082">
+                <a:gridCol w="428684">
                   <a:extLst>
                     <a:ext uri="{9D8B030D-6E8A-4147-A177-3AD203B41FA5}">
                       <a16:colId xmlns:a16="http://schemas.microsoft.com/office/drawing/2014/main" val="857475453"/>
                     </a:ext>
                   </a:extLst>
                 </a:gridCol>
-                <a:gridCol w="663082">
+                <a:gridCol w="428684">
                   <a:extLst>
                     <a:ext uri="{9D8B030D-6E8A-4147-A177-3AD203B41FA5}">
                       <a16:colId xmlns:a16="http://schemas.microsoft.com/office/drawing/2014/main" val="1967939376"/>
@@ -7197,7 +6965,7 @@
                   </a:extLst>
                 </a:gridCol>
               </a:tblGrid>
-              <a:tr h="173076">
+              <a:tr h="219171">
                 <a:tc>
                   <a:txBody>
                     <a:bodyPr/>
@@ -7256,7 +7024,7 @@
                   </a:ext>
                 </a:extLst>
               </a:tr>
-              <a:tr h="173076">
+              <a:tr h="219171">
                 <a:tc>
                   <a:txBody>
                     <a:bodyPr/>
@@ -7315,7 +7083,7 @@
                   </a:ext>
                 </a:extLst>
               </a:tr>
-              <a:tr h="173076">
+              <a:tr h="219171">
                 <a:tc>
                   <a:txBody>
                     <a:bodyPr/>
@@ -7373,7 +7141,7 @@
                   </a:ext>
                 </a:extLst>
               </a:tr>
-              <a:tr h="173076">
+              <a:tr h="219171">
                 <a:tc>
                   <a:txBody>
                     <a:bodyPr/>
@@ -7413,7 +7181,10 @@
                     <a:bodyPr/>
                     <a:lstStyle/>
                     <a:p>
-                      <a:endParaRPr lang="en-US" sz="800" dirty="0"/>
+                      <a:r>
+                        <a:rPr lang="en-US" sz="800" dirty="0"/>
+                        <a:t>34</a:t>
+                      </a:r>
                     </a:p>
                   </a:txBody>
                   <a:tcPr>
@@ -7428,7 +7199,7 @@
                   </a:ext>
                 </a:extLst>
               </a:tr>
-              <a:tr h="173076">
+              <a:tr h="219171">
                 <a:tc>
                   <a:txBody>
                     <a:bodyPr/>
@@ -7436,7 +7207,7 @@
                     <a:p>
                       <a:r>
                         <a:rPr lang="en-US" sz="800" dirty="0"/>
-                        <a:t>55</a:t>
+                        <a:t>…</a:t>
                       </a:r>
                     </a:p>
                   </a:txBody>
@@ -7451,7 +7222,10 @@
                     <a:bodyPr/>
                     <a:lstStyle/>
                     <a:p>
-                      <a:endParaRPr lang="en-US" sz="800" dirty="0"/>
+                      <a:r>
+                        <a:rPr lang="en-US" sz="800" dirty="0"/>
+                        <a:t>….</a:t>
+                      </a:r>
                     </a:p>
                   </a:txBody>
                   <a:tcPr>
@@ -7465,7 +7239,10 @@
                     <a:bodyPr/>
                     <a:lstStyle/>
                     <a:p>
-                      <a:endParaRPr lang="en-US" sz="800" dirty="0"/>
+                      <a:r>
+                        <a:rPr lang="en-US" sz="800" dirty="0"/>
+                        <a:t>…..</a:t>
+                      </a:r>
                     </a:p>
                   </a:txBody>
                   <a:tcPr>
@@ -7499,7 +7276,7 @@
           <p:nvPr/>
         </p:nvPicPr>
         <p:blipFill>
-          <a:blip r:embed="rId12">
+          <a:blip r:embed="rId5">
             <a:extLst>
               <a:ext uri="{28A0092B-C50C-407E-A947-70E740481C1C}">
                 <a14:useLocalDpi xmlns:a14="http://schemas.microsoft.com/office/drawing/2010/main" val="0"/>
@@ -7542,7 +7319,7 @@
           <p:nvPr/>
         </p:nvPicPr>
         <p:blipFill>
-          <a:blip r:embed="rId13">
+          <a:blip r:embed="rId6">
             <a:extLst>
               <a:ext uri="{28A0092B-C50C-407E-A947-70E740481C1C}">
                 <a14:useLocalDpi xmlns:a14="http://schemas.microsoft.com/office/drawing/2010/main" val="0"/>
@@ -7585,7 +7362,7 @@
           <p:nvPr/>
         </p:nvPicPr>
         <p:blipFill>
-          <a:blip r:embed="rId14">
+          <a:blip r:embed="rId7">
             <a:extLst>
               <a:ext uri="{28A0092B-C50C-407E-A947-70E740481C1C}">
                 <a14:useLocalDpi xmlns:a14="http://schemas.microsoft.com/office/drawing/2010/main" val="0"/>
@@ -7628,7 +7405,7 @@
           <p:nvPr/>
         </p:nvPicPr>
         <p:blipFill>
-          <a:blip r:embed="rId15">
+          <a:blip r:embed="rId8">
             <a:extLst>
               <a:ext uri="{28A0092B-C50C-407E-A947-70E740481C1C}">
                 <a14:useLocalDpi xmlns:a14="http://schemas.microsoft.com/office/drawing/2010/main" val="0"/>
@@ -7671,7 +7448,7 @@
           <p:nvPr/>
         </p:nvPicPr>
         <p:blipFill>
-          <a:blip r:embed="rId16"/>
+          <a:blip r:embed="rId9"/>
           <a:stretch>
             <a:fillRect/>
           </a:stretch>
@@ -7708,7 +7485,7 @@
           <p:nvPr/>
         </p:nvPicPr>
         <p:blipFill>
-          <a:blip r:embed="rId17">
+          <a:blip r:embed="rId10">
             <a:extLst>
               <a:ext uri="{28A0092B-C50C-407E-A947-70E740481C1C}">
                 <a14:useLocalDpi xmlns:a14="http://schemas.microsoft.com/office/drawing/2010/main" val="0"/>
@@ -7751,7 +7528,7 @@
           <p:nvPr/>
         </p:nvPicPr>
         <p:blipFill>
-          <a:blip r:embed="rId18">
+          <a:blip r:embed="rId11">
             <a:extLst>
               <a:ext uri="{28A0092B-C50C-407E-A947-70E740481C1C}">
                 <a14:useLocalDpi xmlns:a14="http://schemas.microsoft.com/office/drawing/2010/main" val="0"/>
@@ -7766,6 +7543,611 @@
           <a:xfrm>
             <a:off x="9338779" y="3554838"/>
             <a:ext cx="2628105" cy="693319"/>
+          </a:xfrm>
+          <a:prstGeom prst="rect">
+            <a:avLst/>
+          </a:prstGeom>
+          <a:ln>
+            <a:solidFill>
+              <a:schemeClr val="bg1">
+                <a:lumMod val="65000"/>
+              </a:schemeClr>
+            </a:solidFill>
+          </a:ln>
+        </p:spPr>
+      </p:pic>
+      <p:sp>
+        <p:nvSpPr>
+          <p:cNvPr id="50" name="TextBox 49">
+            <a:extLst>
+              <a:ext uri="{FF2B5EF4-FFF2-40B4-BE49-F238E27FC236}">
+                <a16:creationId xmlns:a16="http://schemas.microsoft.com/office/drawing/2014/main" id="{F3AA7F14-2598-4F08-9263-BDCD99EC496A}"/>
+              </a:ext>
+            </a:extLst>
+          </p:cNvPr>
+          <p:cNvSpPr txBox="1"/>
+          <p:nvPr/>
+        </p:nvSpPr>
+        <p:spPr>
+          <a:xfrm>
+            <a:off x="203645" y="2358265"/>
+            <a:ext cx="1283561" cy="278602"/>
+          </a:xfrm>
+          <a:prstGeom prst="rect">
+            <a:avLst/>
+          </a:prstGeom>
+          <a:noFill/>
+        </p:spPr>
+        <p:txBody>
+          <a:bodyPr wrap="square" rtlCol="0">
+            <a:spAutoFit/>
+          </a:bodyPr>
+          <a:lstStyle>
+            <a:defPPr>
+              <a:defRPr lang="en-US"/>
+            </a:defPPr>
+            <a:lvl1pPr>
+              <a:lnSpc>
+                <a:spcPct val="150000"/>
+              </a:lnSpc>
+              <a:defRPr sz="900">
+                <a:latin typeface="Consolas" panose="020B0609020204030204" pitchFamily="49" charset="0"/>
+              </a:defRPr>
+            </a:lvl1pPr>
+          </a:lstStyle>
+          <a:p>
+            <a:r>
+              <a:rPr lang="en-US" altLang="en-US" b="1" dirty="0">
+                <a:latin typeface="+mn-lt"/>
+              </a:rPr>
+              <a:t>     my_gridded_file.csv</a:t>
+            </a:r>
+          </a:p>
+        </p:txBody>
+      </p:sp>
+      <p:pic>
+        <p:nvPicPr>
+          <p:cNvPr id="4" name="Picture 3" descr="Map&#10;&#10;Description automatically generated">
+            <a:extLst>
+              <a:ext uri="{FF2B5EF4-FFF2-40B4-BE49-F238E27FC236}">
+                <a16:creationId xmlns:a16="http://schemas.microsoft.com/office/drawing/2014/main" id="{ADA431D8-6704-4560-8AEF-6EEEF4C10559}"/>
+              </a:ext>
+            </a:extLst>
+          </p:cNvPr>
+          <p:cNvPicPr>
+            <a:picLocks noChangeAspect="1"/>
+          </p:cNvPicPr>
+          <p:nvPr/>
+        </p:nvPicPr>
+        <p:blipFill rotWithShape="1">
+          <a:blip r:embed="rId12">
+            <a:extLst>
+              <a:ext uri="{28A0092B-C50C-407E-A947-70E740481C1C}">
+                <a14:useLocalDpi xmlns:a14="http://schemas.microsoft.com/office/drawing/2010/main" val="0"/>
+              </a:ext>
+            </a:extLst>
+          </a:blip>
+          <a:srcRect r="16234"/>
+          <a:stretch/>
+        </p:blipFill>
+        <p:spPr>
+          <a:xfrm>
+            <a:off x="3475760" y="5990721"/>
+            <a:ext cx="1132927" cy="662073"/>
+          </a:xfrm>
+          <a:prstGeom prst="rect">
+            <a:avLst/>
+          </a:prstGeom>
+          <a:ln>
+            <a:solidFill>
+              <a:schemeClr val="bg1">
+                <a:lumMod val="65000"/>
+              </a:schemeClr>
+            </a:solidFill>
+          </a:ln>
+        </p:spPr>
+      </p:pic>
+      <p:pic>
+        <p:nvPicPr>
+          <p:cNvPr id="54" name="Picture 53" descr="Map&#10;&#10;Description automatically generated">
+            <a:extLst>
+              <a:ext uri="{FF2B5EF4-FFF2-40B4-BE49-F238E27FC236}">
+                <a16:creationId xmlns:a16="http://schemas.microsoft.com/office/drawing/2014/main" id="{31C55EC0-785B-45F3-B8ED-DC0F11CA9654}"/>
+              </a:ext>
+            </a:extLst>
+          </p:cNvPr>
+          <p:cNvPicPr>
+            <a:picLocks noChangeAspect="1"/>
+          </p:cNvPicPr>
+          <p:nvPr/>
+        </p:nvPicPr>
+        <p:blipFill rotWithShape="1">
+          <a:blip r:embed="rId12">
+            <a:extLst>
+              <a:ext uri="{28A0092B-C50C-407E-A947-70E740481C1C}">
+                <a14:useLocalDpi xmlns:a14="http://schemas.microsoft.com/office/drawing/2010/main" val="0"/>
+              </a:ext>
+            </a:extLst>
+          </a:blip>
+          <a:srcRect l="85746" t="40874" b="33532"/>
+          <a:stretch/>
+        </p:blipFill>
+        <p:spPr>
+          <a:xfrm>
+            <a:off x="4713695" y="5990722"/>
+            <a:ext cx="753236" cy="662072"/>
+          </a:xfrm>
+          <a:prstGeom prst="rect">
+            <a:avLst/>
+          </a:prstGeom>
+          <a:ln>
+            <a:solidFill>
+              <a:schemeClr val="bg1">
+                <a:lumMod val="65000"/>
+              </a:schemeClr>
+            </a:solidFill>
+          </a:ln>
+        </p:spPr>
+      </p:pic>
+      <p:pic>
+        <p:nvPicPr>
+          <p:cNvPr id="8" name="Picture 7" descr="Map&#10;&#10;Description automatically generated">
+            <a:extLst>
+              <a:ext uri="{FF2B5EF4-FFF2-40B4-BE49-F238E27FC236}">
+                <a16:creationId xmlns:a16="http://schemas.microsoft.com/office/drawing/2014/main" id="{B2AF1CE0-9FFD-40A8-8F67-C0710C0C7E97}"/>
+              </a:ext>
+            </a:extLst>
+          </p:cNvPr>
+          <p:cNvPicPr>
+            <a:picLocks noChangeAspect="1"/>
+          </p:cNvPicPr>
+          <p:nvPr/>
+        </p:nvPicPr>
+        <p:blipFill rotWithShape="1">
+          <a:blip r:embed="rId13">
+            <a:extLst>
+              <a:ext uri="{28A0092B-C50C-407E-A947-70E740481C1C}">
+                <a14:useLocalDpi xmlns:a14="http://schemas.microsoft.com/office/drawing/2010/main" val="0"/>
+              </a:ext>
+            </a:extLst>
+          </a:blip>
+          <a:srcRect t="11667" r="17724"/>
+          <a:stretch/>
+        </p:blipFill>
+        <p:spPr>
+          <a:xfrm>
+            <a:off x="7952737" y="5993740"/>
+            <a:ext cx="1245030" cy="658166"/>
+          </a:xfrm>
+          <a:prstGeom prst="rect">
+            <a:avLst/>
+          </a:prstGeom>
+          <a:ln>
+            <a:solidFill>
+              <a:schemeClr val="bg1">
+                <a:lumMod val="65000"/>
+              </a:schemeClr>
+            </a:solidFill>
+          </a:ln>
+        </p:spPr>
+      </p:pic>
+      <p:pic>
+        <p:nvPicPr>
+          <p:cNvPr id="11" name="Picture 10" descr="Map&#10;&#10;Description automatically generated">
+            <a:extLst>
+              <a:ext uri="{FF2B5EF4-FFF2-40B4-BE49-F238E27FC236}">
+                <a16:creationId xmlns:a16="http://schemas.microsoft.com/office/drawing/2014/main" id="{4D8C5588-2A97-4FA8-855D-95A2407AC755}"/>
+              </a:ext>
+            </a:extLst>
+          </p:cNvPr>
+          <p:cNvPicPr>
+            <a:picLocks noChangeAspect="1"/>
+          </p:cNvPicPr>
+          <p:nvPr/>
+        </p:nvPicPr>
+        <p:blipFill rotWithShape="1">
+          <a:blip r:embed="rId14">
+            <a:extLst>
+              <a:ext uri="{28A0092B-C50C-407E-A947-70E740481C1C}">
+                <a14:useLocalDpi xmlns:a14="http://schemas.microsoft.com/office/drawing/2010/main" val="0"/>
+              </a:ext>
+            </a:extLst>
+          </a:blip>
+          <a:srcRect l="86332" t="34732" b="26106"/>
+          <a:stretch/>
+        </p:blipFill>
+        <p:spPr>
+          <a:xfrm>
+            <a:off x="7414829" y="5999929"/>
+            <a:ext cx="464846" cy="651977"/>
+          </a:xfrm>
+          <a:prstGeom prst="rect">
+            <a:avLst/>
+          </a:prstGeom>
+          <a:ln>
+            <a:solidFill>
+              <a:schemeClr val="bg1">
+                <a:lumMod val="65000"/>
+              </a:schemeClr>
+            </a:solidFill>
+          </a:ln>
+        </p:spPr>
+      </p:pic>
+      <p:pic>
+        <p:nvPicPr>
+          <p:cNvPr id="59" name="Picture 58" descr="Map&#10;&#10;Description automatically generated">
+            <a:extLst>
+              <a:ext uri="{FF2B5EF4-FFF2-40B4-BE49-F238E27FC236}">
+                <a16:creationId xmlns:a16="http://schemas.microsoft.com/office/drawing/2014/main" id="{63FADA4E-672E-40F3-8658-A994D32B44D1}"/>
+              </a:ext>
+            </a:extLst>
+          </p:cNvPr>
+          <p:cNvPicPr>
+            <a:picLocks noChangeAspect="1"/>
+          </p:cNvPicPr>
+          <p:nvPr/>
+        </p:nvPicPr>
+        <p:blipFill rotWithShape="1">
+          <a:blip r:embed="rId14">
+            <a:extLst>
+              <a:ext uri="{28A0092B-C50C-407E-A947-70E740481C1C}">
+                <a14:useLocalDpi xmlns:a14="http://schemas.microsoft.com/office/drawing/2010/main" val="0"/>
+              </a:ext>
+            </a:extLst>
+          </a:blip>
+          <a:srcRect l="3852" t="10623" r="17343" b="4623"/>
+          <a:stretch/>
+        </p:blipFill>
+        <p:spPr>
+          <a:xfrm>
+            <a:off x="6089939" y="5993813"/>
+            <a:ext cx="1257564" cy="662073"/>
+          </a:xfrm>
+          <a:prstGeom prst="rect">
+            <a:avLst/>
+          </a:prstGeom>
+          <a:ln>
+            <a:solidFill>
+              <a:schemeClr val="bg1">
+                <a:lumMod val="65000"/>
+              </a:schemeClr>
+            </a:solidFill>
+          </a:ln>
+        </p:spPr>
+      </p:pic>
+      <p:pic>
+        <p:nvPicPr>
+          <p:cNvPr id="60" name="Picture 59" descr="Map&#10;&#10;Description automatically generated">
+            <a:extLst>
+              <a:ext uri="{FF2B5EF4-FFF2-40B4-BE49-F238E27FC236}">
+                <a16:creationId xmlns:a16="http://schemas.microsoft.com/office/drawing/2014/main" id="{40BE6FB0-05BF-4769-B29D-B7084CE90A41}"/>
+              </a:ext>
+            </a:extLst>
+          </p:cNvPr>
+          <p:cNvPicPr>
+            <a:picLocks noChangeAspect="1"/>
+          </p:cNvPicPr>
+          <p:nvPr/>
+        </p:nvPicPr>
+        <p:blipFill rotWithShape="1">
+          <a:blip r:embed="rId13">
+            <a:extLst>
+              <a:ext uri="{28A0092B-C50C-407E-A947-70E740481C1C}">
+                <a14:useLocalDpi xmlns:a14="http://schemas.microsoft.com/office/drawing/2010/main" val="0"/>
+              </a:ext>
+            </a:extLst>
+          </a:blip>
+          <a:srcRect l="87299" t="30496" b="24448"/>
+          <a:stretch/>
+        </p:blipFill>
+        <p:spPr>
+          <a:xfrm>
+            <a:off x="9273453" y="5990721"/>
+            <a:ext cx="373273" cy="651977"/>
+          </a:xfrm>
+          <a:prstGeom prst="rect">
+            <a:avLst/>
+          </a:prstGeom>
+          <a:ln>
+            <a:solidFill>
+              <a:schemeClr val="bg1">
+                <a:lumMod val="65000"/>
+              </a:schemeClr>
+            </a:solidFill>
+          </a:ln>
+        </p:spPr>
+      </p:pic>
+      <p:pic>
+        <p:nvPicPr>
+          <p:cNvPr id="13" name="Picture 12" descr="Map&#10;&#10;Description automatically generated">
+            <a:extLst>
+              <a:ext uri="{FF2B5EF4-FFF2-40B4-BE49-F238E27FC236}">
+                <a16:creationId xmlns:a16="http://schemas.microsoft.com/office/drawing/2014/main" id="{AD40F024-CBFA-4F93-8AE1-ADE436B8ED7C}"/>
+              </a:ext>
+            </a:extLst>
+          </p:cNvPr>
+          <p:cNvPicPr>
+            <a:picLocks noChangeAspect="1"/>
+          </p:cNvPicPr>
+          <p:nvPr/>
+        </p:nvPicPr>
+        <p:blipFill>
+          <a:blip r:embed="rId15">
+            <a:extLst>
+              <a:ext uri="{28A0092B-C50C-407E-A947-70E740481C1C}">
+                <a14:useLocalDpi xmlns:a14="http://schemas.microsoft.com/office/drawing/2010/main" val="0"/>
+              </a:ext>
+            </a:extLst>
+          </a:blip>
+          <a:stretch>
+            <a:fillRect/>
+          </a:stretch>
+        </p:blipFill>
+        <p:spPr>
+          <a:xfrm>
+            <a:off x="10036145" y="5990529"/>
+            <a:ext cx="1591875" cy="657974"/>
+          </a:xfrm>
+          <a:prstGeom prst="rect">
+            <a:avLst/>
+          </a:prstGeom>
+          <a:ln>
+            <a:solidFill>
+              <a:schemeClr val="bg1">
+                <a:lumMod val="65000"/>
+              </a:schemeClr>
+            </a:solidFill>
+          </a:ln>
+        </p:spPr>
+      </p:pic>
+      <p:sp>
+        <p:nvSpPr>
+          <p:cNvPr id="62" name="TextBox 61">
+            <a:extLst>
+              <a:ext uri="{FF2B5EF4-FFF2-40B4-BE49-F238E27FC236}">
+                <a16:creationId xmlns:a16="http://schemas.microsoft.com/office/drawing/2014/main" id="{F34F1C09-7423-4B57-B28A-2E6F780E32AD}"/>
+              </a:ext>
+            </a:extLst>
+          </p:cNvPr>
+          <p:cNvSpPr txBox="1"/>
+          <p:nvPr/>
+        </p:nvSpPr>
+        <p:spPr>
+          <a:xfrm>
+            <a:off x="1753028" y="2830309"/>
+            <a:ext cx="1169416" cy="694101"/>
+          </a:xfrm>
+          <a:prstGeom prst="rect">
+            <a:avLst/>
+          </a:prstGeom>
+          <a:noFill/>
+        </p:spPr>
+        <p:txBody>
+          <a:bodyPr wrap="square" rtlCol="0">
+            <a:spAutoFit/>
+          </a:bodyPr>
+          <a:lstStyle>
+            <a:defPPr>
+              <a:defRPr lang="en-US"/>
+            </a:defPPr>
+            <a:lvl1pPr>
+              <a:lnSpc>
+                <a:spcPct val="150000"/>
+              </a:lnSpc>
+              <a:defRPr sz="900">
+                <a:latin typeface="Consolas" panose="020B0609020204030204" pitchFamily="49" charset="0"/>
+              </a:defRPr>
+            </a:lvl1pPr>
+          </a:lstStyle>
+          <a:p>
+            <a:r>
+              <a:rPr lang="en-US" altLang="en-US" b="1" dirty="0">
+                <a:solidFill>
+                  <a:srgbClr val="C00000"/>
+                </a:solidFill>
+                <a:latin typeface="+mn-lt"/>
+              </a:rPr>
+              <a:t>NOTE: Works for regularly spaced gridded data</a:t>
+            </a:r>
+          </a:p>
+        </p:txBody>
+      </p:sp>
+      <p:sp>
+        <p:nvSpPr>
+          <p:cNvPr id="64" name="TextBox 63">
+            <a:extLst>
+              <a:ext uri="{FF2B5EF4-FFF2-40B4-BE49-F238E27FC236}">
+                <a16:creationId xmlns:a16="http://schemas.microsoft.com/office/drawing/2014/main" id="{4AAACFCD-AE27-4C22-B0E3-F3E62FF3191E}"/>
+              </a:ext>
+            </a:extLst>
+          </p:cNvPr>
+          <p:cNvSpPr txBox="1"/>
+          <p:nvPr/>
+        </p:nvSpPr>
+        <p:spPr>
+          <a:xfrm>
+            <a:off x="195913" y="5084202"/>
+            <a:ext cx="1763624" cy="230832"/>
+          </a:xfrm>
+          <a:prstGeom prst="rect">
+            <a:avLst/>
+          </a:prstGeom>
+          <a:solidFill>
+            <a:schemeClr val="bg1">
+              <a:lumMod val="75000"/>
+            </a:schemeClr>
+          </a:solidFill>
+        </p:spPr>
+        <p:txBody>
+          <a:bodyPr wrap="none" rtlCol="0">
+            <a:spAutoFit/>
+          </a:bodyPr>
+          <a:lstStyle/>
+          <a:p>
+            <a:r>
+              <a:rPr lang="en-US" sz="900" b="1" dirty="0"/>
+              <a:t>RUN BASIC MAP WITHOUT DATA</a:t>
+            </a:r>
+          </a:p>
+        </p:txBody>
+      </p:sp>
+      <p:sp>
+        <p:nvSpPr>
+          <p:cNvPr id="66" name="Rectangle: Rounded Corners 65">
+            <a:extLst>
+              <a:ext uri="{FF2B5EF4-FFF2-40B4-BE49-F238E27FC236}">
+                <a16:creationId xmlns:a16="http://schemas.microsoft.com/office/drawing/2014/main" id="{333BE386-E8C7-418B-A0A6-A3C96D42AB4B}"/>
+              </a:ext>
+            </a:extLst>
+          </p:cNvPr>
+          <p:cNvSpPr/>
+          <p:nvPr/>
+        </p:nvSpPr>
+        <p:spPr>
+          <a:xfrm>
+            <a:off x="195070" y="5378770"/>
+            <a:ext cx="2799549" cy="559588"/>
+          </a:xfrm>
+          <a:prstGeom prst="roundRect">
+            <a:avLst/>
+          </a:prstGeom>
+          <a:solidFill>
+            <a:schemeClr val="bg1">
+              <a:lumMod val="95000"/>
+            </a:schemeClr>
+          </a:solidFill>
+          <a:ln>
+            <a:solidFill>
+              <a:schemeClr val="bg1">
+                <a:lumMod val="75000"/>
+              </a:schemeClr>
+            </a:solidFill>
+          </a:ln>
+        </p:spPr>
+        <p:style>
+          <a:lnRef idx="2">
+            <a:schemeClr val="accent1">
+              <a:shade val="50000"/>
+            </a:schemeClr>
+          </a:lnRef>
+          <a:fillRef idx="1">
+            <a:schemeClr val="accent1"/>
+          </a:fillRef>
+          <a:effectRef idx="0">
+            <a:schemeClr val="accent1"/>
+          </a:effectRef>
+          <a:fontRef idx="minor">
+            <a:schemeClr val="lt1"/>
+          </a:fontRef>
+        </p:style>
+        <p:txBody>
+          <a:bodyPr rtlCol="0" anchor="ctr"/>
+          <a:lstStyle/>
+          <a:p>
+            <a:r>
+              <a:rPr lang="en-US" altLang="en-US" sz="800" dirty="0">
+                <a:solidFill>
+                  <a:schemeClr val="tx1"/>
+                </a:solidFill>
+              </a:rPr>
+              <a:t>library(</a:t>
+            </a:r>
+            <a:r>
+              <a:rPr lang="en-US" altLang="en-US" sz="800" dirty="0" err="1">
+                <a:solidFill>
+                  <a:schemeClr val="tx1"/>
+                </a:solidFill>
+              </a:rPr>
+              <a:t>rmap</a:t>
+            </a:r>
+            <a:r>
+              <a:rPr lang="en-US" altLang="en-US" sz="800" dirty="0">
+                <a:solidFill>
+                  <a:schemeClr val="tx1"/>
+                </a:solidFill>
+              </a:rPr>
+              <a:t>)</a:t>
+            </a:r>
+          </a:p>
+          <a:p>
+            <a:r>
+              <a:rPr lang="en-US" altLang="en-US" sz="800" dirty="0">
+                <a:solidFill>
+                  <a:schemeClr val="tx1"/>
+                </a:solidFill>
+              </a:rPr>
+              <a:t># List of all available maps: </a:t>
+            </a:r>
+          </a:p>
+          <a:p>
+            <a:r>
+              <a:rPr lang="en-US" altLang="en-US" sz="800" dirty="0">
+                <a:solidFill>
+                  <a:schemeClr val="tx1"/>
+                </a:solidFill>
+              </a:rPr>
+              <a:t># </a:t>
+            </a:r>
+            <a:r>
+              <a:rPr lang="en-US" altLang="en-US" sz="800" dirty="0">
+                <a:solidFill>
+                  <a:schemeClr val="tx1"/>
+                </a:solidFill>
+                <a:hlinkClick r:id="rId16"/>
+              </a:rPr>
+              <a:t>https://jgcri.github.io/rmap/reference/index.html</a:t>
+            </a:r>
+            <a:r>
+              <a:rPr lang="en-US" altLang="en-US" sz="800" dirty="0">
+                <a:solidFill>
+                  <a:schemeClr val="tx1"/>
+                </a:solidFill>
+              </a:rPr>
+              <a:t> </a:t>
+            </a:r>
+          </a:p>
+          <a:p>
+            <a:r>
+              <a:rPr lang="en-US" altLang="en-US" sz="800" dirty="0">
+                <a:solidFill>
+                  <a:schemeClr val="tx1"/>
+                </a:solidFill>
+              </a:rPr>
+              <a:t>map(mapUS49)</a:t>
+            </a:r>
+          </a:p>
+        </p:txBody>
+      </p:sp>
+      <p:pic>
+        <p:nvPicPr>
+          <p:cNvPr id="16" name="Picture 15" descr="Map&#10;&#10;Description automatically generated">
+            <a:extLst>
+              <a:ext uri="{FF2B5EF4-FFF2-40B4-BE49-F238E27FC236}">
+                <a16:creationId xmlns:a16="http://schemas.microsoft.com/office/drawing/2014/main" id="{936BDBD0-FEEA-4029-94C4-4AC80238E0D6}"/>
+              </a:ext>
+            </a:extLst>
+          </p:cNvPr>
+          <p:cNvPicPr>
+            <a:picLocks noChangeAspect="1"/>
+          </p:cNvPicPr>
+          <p:nvPr/>
+        </p:nvPicPr>
+        <p:blipFill>
+          <a:blip r:embed="rId17">
+            <a:extLst>
+              <a:ext uri="{28A0092B-C50C-407E-A947-70E740481C1C}">
+                <a14:useLocalDpi xmlns:a14="http://schemas.microsoft.com/office/drawing/2010/main" val="0"/>
+              </a:ext>
+            </a:extLst>
+          </a:blip>
+          <a:stretch>
+            <a:fillRect/>
+          </a:stretch>
+        </p:blipFill>
+        <p:spPr>
+          <a:xfrm>
+            <a:off x="871336" y="6005146"/>
+            <a:ext cx="1231739" cy="653408"/>
           </a:xfrm>
           <a:prstGeom prst="rect">
             <a:avLst/>

</xml_diff>